<commit_message>
-Final presentation submisstion #2
</commit_message>
<xml_diff>
--- a/Capstone – Presentation.pptx
+++ b/Capstone – Presentation.pptx
@@ -5,7 +5,7 @@
     <p:sldMasterId id="2147483648" r:id="rId1"/>
   </p:sldMasterIdLst>
   <p:notesMasterIdLst>
-    <p:notesMasterId r:id="rId20"/>
+    <p:notesMasterId r:id="rId27"/>
   </p:notesMasterIdLst>
   <p:sldIdLst>
     <p:sldId id="256" r:id="rId2"/>
@@ -21,11 +21,18 @@
     <p:sldId id="265" r:id="rId12"/>
     <p:sldId id="269" r:id="rId13"/>
     <p:sldId id="270" r:id="rId14"/>
-    <p:sldId id="272" r:id="rId15"/>
-    <p:sldId id="271" r:id="rId16"/>
-    <p:sldId id="273" r:id="rId17"/>
-    <p:sldId id="274" r:id="rId18"/>
-    <p:sldId id="275" r:id="rId19"/>
+    <p:sldId id="271" r:id="rId15"/>
+    <p:sldId id="272" r:id="rId16"/>
+    <p:sldId id="276" r:id="rId17"/>
+    <p:sldId id="279" r:id="rId18"/>
+    <p:sldId id="280" r:id="rId19"/>
+    <p:sldId id="278" r:id="rId20"/>
+    <p:sldId id="281" r:id="rId21"/>
+    <p:sldId id="282" r:id="rId22"/>
+    <p:sldId id="283" r:id="rId23"/>
+    <p:sldId id="284" r:id="rId24"/>
+    <p:sldId id="274" r:id="rId25"/>
+    <p:sldId id="275" r:id="rId26"/>
   </p:sldIdLst>
   <p:sldSz cx="9144000" cy="6858000" type="screen4x3"/>
   <p:notesSz cx="6858000" cy="9144000"/>
@@ -1085,6 +1092,13 @@
         </dgm:presLayoutVars>
       </dgm:prSet>
       <dgm:spPr/>
+      <dgm:t>
+        <a:bodyPr/>
+        <a:lstStyle/>
+        <a:p>
+          <a:endParaRPr lang="en-US"/>
+        </a:p>
+      </dgm:t>
     </dgm:pt>
     <dgm:pt modelId="{D531BCB4-05DD-430F-95B0-4BF57DC19FF6}" type="pres">
       <dgm:prSet presAssocID="{709281E2-F01C-473F-9891-EA8B70521970}" presName="composite" presStyleCnt="0"/>
@@ -1192,6 +1206,13 @@
         </dgm:presLayoutVars>
       </dgm:prSet>
       <dgm:spPr/>
+      <dgm:t>
+        <a:bodyPr/>
+        <a:lstStyle/>
+        <a:p>
+          <a:endParaRPr lang="en-US"/>
+        </a:p>
+      </dgm:t>
     </dgm:pt>
     <dgm:pt modelId="{841CCF52-2884-4AF1-A201-69D5F13E01CC}" type="pres">
       <dgm:prSet presAssocID="{B92C36C5-2B44-493B-A33A-3CB981701F9D}" presName="Child2Accent1" presStyleLbl="alignNode1" presStyleIdx="20" presStyleCnt="42"/>
@@ -1275,6 +1296,13 @@
         </dgm:presLayoutVars>
       </dgm:prSet>
       <dgm:spPr/>
+      <dgm:t>
+        <a:bodyPr/>
+        <a:lstStyle/>
+        <a:p>
+          <a:endParaRPr lang="en-US"/>
+        </a:p>
+      </dgm:t>
     </dgm:pt>
     <dgm:pt modelId="{F1BE828C-F7FE-48DD-853B-403E1D3099F6}" type="pres">
       <dgm:prSet presAssocID="{3422519E-7493-4D37-A9C1-08D6259F74C0}" presName="Child4Accent1" presStyleLbl="alignNode1" presStyleIdx="34" presStyleCnt="42"/>
@@ -7184,7 +7212,7 @@
           <a:p>
             <a:fld id="{F843DF7E-BD77-4677-A123-7E54EF9949CF}" type="datetimeFigureOut">
               <a:rPr lang="en-US" smtClean="0"/>
-              <a:t>12/11/2017</a:t>
+              <a:t>12/17/2017</a:t>
             </a:fld>
             <a:endParaRPr lang="en-US"/>
           </a:p>
@@ -7644,7 +7672,7 @@
           <a:p>
             <a:fld id="{ED6EB48C-23E2-4101-AAE7-F4DA71A1A33C}" type="datetime1">
               <a:rPr lang="en-US" smtClean="0"/>
-              <a:t>12/11/2017</a:t>
+              <a:t>12/17/2017</a:t>
             </a:fld>
             <a:endParaRPr lang="en-US" dirty="0"/>
           </a:p>
@@ -7810,7 +7838,7 @@
           <a:p>
             <a:fld id="{C5B6977C-E8EB-49B7-A2E5-73E23EF79448}" type="datetime1">
               <a:rPr lang="en-US" smtClean="0"/>
-              <a:t>12/11/2017</a:t>
+              <a:t>12/17/2017</a:t>
             </a:fld>
             <a:endParaRPr lang="en-US"/>
           </a:p>
@@ -7986,7 +8014,7 @@
           <a:p>
             <a:fld id="{81DD375F-B008-4D9D-BD50-3D37A02C88AF}" type="datetime1">
               <a:rPr lang="en-US" smtClean="0"/>
-              <a:t>12/11/2017</a:t>
+              <a:t>12/17/2017</a:t>
             </a:fld>
             <a:endParaRPr lang="en-US"/>
           </a:p>
@@ -8170,7 +8198,7 @@
           <a:p>
             <a:fld id="{90F748F4-7D77-45D9-8508-920EE8AD1198}" type="datetime1">
               <a:rPr lang="en-US" smtClean="0"/>
-              <a:t>12/11/2017</a:t>
+              <a:t>12/17/2017</a:t>
             </a:fld>
             <a:endParaRPr lang="en-US"/>
           </a:p>
@@ -8433,7 +8461,7 @@
           <a:p>
             <a:fld id="{E6579D85-939E-4757-9958-E7965991F88D}" type="datetime1">
               <a:rPr lang="en-US" smtClean="0"/>
-              <a:t>12/11/2017</a:t>
+              <a:t>12/17/2017</a:t>
             </a:fld>
             <a:endParaRPr lang="en-US"/>
           </a:p>
@@ -8782,7 +8810,7 @@
           <a:p>
             <a:fld id="{DCEE8E31-A027-4B04-916E-C4A55B4D93E4}" type="datetime1">
               <a:rPr lang="en-US" smtClean="0"/>
-              <a:t>12/11/2017</a:t>
+              <a:t>12/17/2017</a:t>
             </a:fld>
             <a:endParaRPr lang="en-US"/>
           </a:p>
@@ -9091,7 +9119,7 @@
           <a:p>
             <a:fld id="{F6B5B98E-5E85-4DC8-A61F-0747553220C0}" type="datetime1">
               <a:rPr lang="en-US" smtClean="0"/>
-              <a:t>12/11/2017</a:t>
+              <a:t>12/17/2017</a:t>
             </a:fld>
             <a:endParaRPr lang="en-US"/>
           </a:p>
@@ -9319,7 +9347,7 @@
           <a:p>
             <a:fld id="{EABEBAE7-C0F9-4A75-9F4D-2FFE0ED6FB31}" type="datetime1">
               <a:rPr lang="en-US" smtClean="0"/>
-              <a:t>12/11/2017</a:t>
+              <a:t>12/17/2017</a:t>
             </a:fld>
             <a:endParaRPr lang="en-US"/>
           </a:p>
@@ -9410,7 +9438,7 @@
           <a:p>
             <a:fld id="{194618D4-5447-4E27-B931-C53AC790258E}" type="datetime1">
               <a:rPr lang="en-US" smtClean="0"/>
-              <a:t>12/11/2017</a:t>
+              <a:t>12/17/2017</a:t>
             </a:fld>
             <a:endParaRPr lang="en-US"/>
           </a:p>
@@ -9699,7 +9727,7 @@
           <a:p>
             <a:fld id="{D77C1CE6-F8CB-431A-B7F3-8DA1E68608CD}" type="datetime1">
               <a:rPr lang="en-US" smtClean="0"/>
-              <a:t>12/11/2017</a:t>
+              <a:t>12/17/2017</a:t>
             </a:fld>
             <a:endParaRPr lang="en-US"/>
           </a:p>
@@ -9969,7 +9997,7 @@
           <a:p>
             <a:fld id="{460C2BC8-D0F8-4DBC-B23E-F4540546E12E}" type="datetime1">
               <a:rPr lang="en-US" smtClean="0"/>
-              <a:t>12/11/2017</a:t>
+              <a:t>12/17/2017</a:t>
             </a:fld>
             <a:endParaRPr lang="en-US"/>
           </a:p>
@@ -10180,7 +10208,7 @@
           <a:p>
             <a:fld id="{197BCB74-55D3-4580-BBE7-5A9F2E913BF1}" type="datetime1">
               <a:rPr lang="en-US" smtClean="0"/>
-              <a:t>12/11/2017</a:t>
+              <a:t>12/17/2017</a:t>
             </a:fld>
             <a:endParaRPr lang="en-US" dirty="0"/>
           </a:p>
@@ -11572,7 +11600,7 @@
         <p:spPr>
           <a:xfrm>
             <a:off x="457200" y="1944345"/>
-            <a:ext cx="5227319" cy="3733798"/>
+            <a:ext cx="5227319" cy="3733799"/>
           </a:xfrm>
           <a:ln>
             <a:solidFill>
@@ -11590,7 +11618,7 @@
         <p:spPr>
           <a:xfrm>
             <a:off x="5867400" y="1954410"/>
-            <a:ext cx="3048000" cy="3539430"/>
+            <a:ext cx="3048000" cy="4278094"/>
           </a:xfrm>
           <a:prstGeom prst="rect">
             <a:avLst/>
@@ -11611,7 +11639,34 @@
               <a:rPr lang="en-US" sz="1600" dirty="0" smtClean="0">
                 <a:latin typeface="Georgia" panose="02040502050405020303" pitchFamily="18" charset="0"/>
               </a:rPr>
-              <a:t>Individual trends of features relative to this model</a:t>
+              <a:t>Safe City data set</a:t>
+            </a:r>
+          </a:p>
+          <a:p>
+            <a:pPr marL="285750" indent="-285750">
+              <a:buFont typeface="Arial" panose="020B0604020202020204" pitchFamily="34" charset="0"/>
+              <a:buChar char="•"/>
+            </a:pPr>
+            <a:endParaRPr lang="en-US" sz="1600" dirty="0" smtClean="0">
+              <a:latin typeface="Georgia" panose="02040502050405020303" pitchFamily="18" charset="0"/>
+            </a:endParaRPr>
+          </a:p>
+          <a:p>
+            <a:pPr marL="285750" indent="-285750">
+              <a:buFont typeface="Arial" panose="020B0604020202020204" pitchFamily="34" charset="0"/>
+              <a:buChar char="•"/>
+            </a:pPr>
+            <a:r>
+              <a:rPr lang="en-US" sz="1600" dirty="0" err="1">
+                <a:latin typeface="Georgia" panose="02040502050405020303" pitchFamily="18" charset="0"/>
+              </a:rPr>
+              <a:t>Adjr</a:t>
+            </a:r>
+            <a:r>
+              <a:rPr lang="en-US" sz="1600" dirty="0">
+                <a:latin typeface="Georgia" panose="02040502050405020303" pitchFamily="18" charset="0"/>
+              </a:rPr>
+              <a:t>. R2 is a measure of fit of our model to our data</a:t>
             </a:r>
           </a:p>
           <a:p>
@@ -11629,11 +11684,20 @@
               <a:buChar char="•"/>
             </a:pPr>
             <a:r>
+              <a:rPr lang="en-US" sz="1600" dirty="0">
+                <a:latin typeface="Georgia" panose="02040502050405020303" pitchFamily="18" charset="0"/>
+              </a:rPr>
+              <a:t>Darker = better </a:t>
+            </a:r>
+            <a:r>
               <a:rPr lang="en-US" sz="1600" dirty="0" smtClean="0">
                 <a:latin typeface="Georgia" panose="02040502050405020303" pitchFamily="18" charset="0"/>
               </a:rPr>
-              <a:t>Visualize relative impact on model for VCR</a:t>
-            </a:r>
+              <a:t>fit</a:t>
+            </a:r>
+            <a:endParaRPr lang="en-US" sz="1600" dirty="0">
+              <a:latin typeface="Georgia" panose="02040502050405020303" pitchFamily="18" charset="0"/>
+            </a:endParaRPr>
           </a:p>
           <a:p>
             <a:pPr marL="285750" indent="-285750">
@@ -11650,10 +11714,31 @@
               <a:buChar char="•"/>
             </a:pPr>
             <a:r>
+              <a:rPr lang="en-US" sz="1600" dirty="0">
+                <a:latin typeface="Georgia" panose="02040502050405020303" pitchFamily="18" charset="0"/>
+              </a:rPr>
+              <a:t>More features ≠ better model</a:t>
+            </a:r>
+          </a:p>
+          <a:p>
+            <a:pPr marL="285750" indent="-285750">
+              <a:buFont typeface="Arial" panose="020B0604020202020204" pitchFamily="34" charset="0"/>
+              <a:buChar char="•"/>
+            </a:pPr>
+            <a:endParaRPr lang="en-US" sz="1600" dirty="0" smtClean="0">
+              <a:latin typeface="Georgia" panose="02040502050405020303" pitchFamily="18" charset="0"/>
+            </a:endParaRPr>
+          </a:p>
+          <a:p>
+            <a:pPr marL="285750" indent="-285750">
+              <a:buFont typeface="Arial" panose="020B0604020202020204" pitchFamily="34" charset="0"/>
+              <a:buChar char="•"/>
+            </a:pPr>
+            <a:r>
               <a:rPr lang="en-US" sz="1600" dirty="0" smtClean="0">
                 <a:latin typeface="Georgia" panose="02040502050405020303" pitchFamily="18" charset="0"/>
               </a:rPr>
-              <a:t>CAREFUL!</a:t>
+              <a:t>Optimal model =       Average College Cost + Median Debt +            Median Income +       College Retention Rate</a:t>
             </a:r>
           </a:p>
           <a:p>
@@ -11674,54 +11759,15 @@
               <a:rPr lang="en-US" sz="1600" dirty="0" smtClean="0">
                 <a:latin typeface="Georgia" panose="02040502050405020303" pitchFamily="18" charset="0"/>
               </a:rPr>
-              <a:t>Not to be extrapolated individually for unseen data</a:t>
-            </a:r>
-          </a:p>
-          <a:p>
-            <a:pPr marL="285750" indent="-285750">
-              <a:buFont typeface="Arial" panose="020B0604020202020204" pitchFamily="34" charset="0"/>
-              <a:buChar char="•"/>
-            </a:pPr>
-            <a:endParaRPr lang="en-US" sz="1600" dirty="0">
-              <a:latin typeface="Georgia" panose="02040502050405020303" pitchFamily="18" charset="0"/>
-            </a:endParaRPr>
-          </a:p>
-          <a:p>
-            <a:pPr marL="285750" indent="-285750">
-              <a:buFont typeface="Arial" panose="020B0604020202020204" pitchFamily="34" charset="0"/>
-              <a:buChar char="•"/>
-            </a:pPr>
-            <a:r>
-              <a:rPr lang="en-US" sz="1600" dirty="0" smtClean="0">
-                <a:latin typeface="Georgia" panose="02040502050405020303" pitchFamily="18" charset="0"/>
-              </a:rPr>
-              <a:t>Must use the entire model</a:t>
-            </a:r>
-          </a:p>
-          <a:p>
-            <a:pPr marL="285750" indent="-285750">
-              <a:buFont typeface="Arial" panose="020B0604020202020204" pitchFamily="34" charset="0"/>
-              <a:buChar char="•"/>
-            </a:pPr>
-            <a:endParaRPr lang="en-US" sz="1600" dirty="0">
-              <a:latin typeface="Georgia" panose="02040502050405020303" pitchFamily="18" charset="0"/>
-            </a:endParaRPr>
-          </a:p>
-          <a:p>
-            <a:pPr marL="285750" indent="-285750">
-              <a:buFont typeface="Arial" panose="020B0604020202020204" pitchFamily="34" charset="0"/>
-              <a:buChar char="•"/>
-            </a:pPr>
-            <a:endParaRPr lang="en-US" sz="1600" dirty="0" smtClean="0">
-              <a:latin typeface="Georgia" panose="02040502050405020303" pitchFamily="18" charset="0"/>
-            </a:endParaRPr>
+              <a:t>Why not choose “darkest”?</a:t>
+            </a:r>
           </a:p>
         </p:txBody>
       </p:sp>
     </p:spTree>
     <p:extLst>
       <p:ext uri="{BB962C8B-B14F-4D97-AF65-F5344CB8AC3E}">
-        <p14:creationId xmlns:p14="http://schemas.microsoft.com/office/powerpoint/2010/main" val="4291763524"/>
+        <p14:creationId xmlns:p14="http://schemas.microsoft.com/office/powerpoint/2010/main" val="2614753767"/>
       </p:ext>
     </p:extLst>
   </p:cSld>
@@ -11772,17 +11818,199 @@
           <a:p>
             <a:r>
               <a:rPr lang="en-US" dirty="0" smtClean="0"/>
-              <a:t>Model Generation</a:t>
+              <a:t>Results</a:t>
             </a:r>
             <a:endParaRPr lang="en-US" dirty="0">
               <a:latin typeface="Georgia" panose="02040502050405020303" pitchFamily="18" charset="0"/>
             </a:endParaRPr>
+          </a:p>
+        </p:txBody>
+      </p:sp>
+      <p:sp>
+        <p:nvSpPr>
+          <p:cNvPr id="6" name="TextBox 5"/>
+          <p:cNvSpPr txBox="1"/>
+          <p:nvPr/>
+        </p:nvSpPr>
+        <p:spPr>
+          <a:xfrm>
+            <a:off x="5867400" y="1954410"/>
+            <a:ext cx="3048000" cy="4031873"/>
+          </a:xfrm>
+          <a:prstGeom prst="rect">
+            <a:avLst/>
+          </a:prstGeom>
+          <a:noFill/>
+        </p:spPr>
+        <p:txBody>
+          <a:bodyPr wrap="square" rtlCol="0">
+            <a:spAutoFit/>
+          </a:bodyPr>
+          <a:lstStyle/>
+          <a:p>
+            <a:pPr marL="285750" indent="-285750">
+              <a:buFont typeface="Arial" panose="020B0604020202020204" pitchFamily="34" charset="0"/>
+              <a:buChar char="•"/>
+            </a:pPr>
+            <a:r>
+              <a:rPr lang="en-US" sz="1600" dirty="0" smtClean="0">
+                <a:latin typeface="Georgia" panose="02040502050405020303" pitchFamily="18" charset="0"/>
+              </a:rPr>
+              <a:t>Use Model 5 for violent cities</a:t>
+            </a:r>
+          </a:p>
+          <a:p>
+            <a:pPr marL="285750" indent="-285750">
+              <a:buFont typeface="Arial" panose="020B0604020202020204" pitchFamily="34" charset="0"/>
+              <a:buChar char="•"/>
+            </a:pPr>
+            <a:endParaRPr lang="en-US" sz="1600" dirty="0">
+              <a:latin typeface="Georgia" panose="02040502050405020303" pitchFamily="18" charset="0"/>
+            </a:endParaRPr>
+          </a:p>
+          <a:p>
+            <a:pPr marL="285750" indent="-285750">
+              <a:buFont typeface="Arial" panose="020B0604020202020204" pitchFamily="34" charset="0"/>
+              <a:buChar char="•"/>
+            </a:pPr>
+            <a:r>
+              <a:rPr lang="en-US" sz="1600" dirty="0" smtClean="0">
+                <a:latin typeface="Georgia" panose="02040502050405020303" pitchFamily="18" charset="0"/>
+              </a:rPr>
+              <a:t>Graduation Rate, Unemployment Rate, Median Debt</a:t>
+            </a:r>
+            <a:endParaRPr lang="en-US" sz="1600" dirty="0" smtClean="0">
+              <a:latin typeface="Georgia" panose="02040502050405020303" pitchFamily="18" charset="0"/>
+            </a:endParaRPr>
+          </a:p>
+          <a:p>
+            <a:pPr marL="285750" indent="-285750">
+              <a:buFont typeface="Arial" panose="020B0604020202020204" pitchFamily="34" charset="0"/>
+              <a:buChar char="•"/>
+            </a:pPr>
+            <a:endParaRPr lang="en-US" sz="1600" dirty="0">
+              <a:latin typeface="Georgia" panose="02040502050405020303" pitchFamily="18" charset="0"/>
+            </a:endParaRPr>
+          </a:p>
+          <a:p>
+            <a:pPr marL="285750" indent="-285750">
+              <a:buFont typeface="Arial" panose="020B0604020202020204" pitchFamily="34" charset="0"/>
+              <a:buChar char="•"/>
+            </a:pPr>
+            <a:r>
+              <a:rPr lang="en-US" sz="1600" dirty="0" smtClean="0">
+                <a:latin typeface="Georgia" panose="02040502050405020303" pitchFamily="18" charset="0"/>
+              </a:rPr>
+              <a:t>*Assumptions of the features</a:t>
+            </a:r>
+            <a:endParaRPr lang="en-US" sz="1600" dirty="0" smtClean="0">
+              <a:latin typeface="Georgia" panose="02040502050405020303" pitchFamily="18" charset="0"/>
+            </a:endParaRPr>
+          </a:p>
+          <a:p>
+            <a:pPr marL="285750" indent="-285750">
+              <a:buFont typeface="Arial" panose="020B0604020202020204" pitchFamily="34" charset="0"/>
+              <a:buChar char="•"/>
+            </a:pPr>
+            <a:endParaRPr lang="en-US" sz="1600" dirty="0">
+              <a:latin typeface="Georgia" panose="02040502050405020303" pitchFamily="18" charset="0"/>
+            </a:endParaRPr>
+          </a:p>
+          <a:p>
+            <a:pPr marL="285750" indent="-285750">
+              <a:buFont typeface="Arial" panose="020B0604020202020204" pitchFamily="34" charset="0"/>
+              <a:buChar char="•"/>
+            </a:pPr>
+            <a:r>
+              <a:rPr lang="en-US" sz="1600" dirty="0" smtClean="0">
+                <a:latin typeface="Georgia" panose="02040502050405020303" pitchFamily="18" charset="0"/>
+              </a:rPr>
+              <a:t>Not to be extrapolated individually for unseen data</a:t>
+            </a:r>
+          </a:p>
+          <a:p>
+            <a:pPr marL="285750" indent="-285750">
+              <a:buFont typeface="Arial" panose="020B0604020202020204" pitchFamily="34" charset="0"/>
+              <a:buChar char="•"/>
+            </a:pPr>
+            <a:endParaRPr lang="en-US" sz="1600" dirty="0">
+              <a:latin typeface="Georgia" panose="02040502050405020303" pitchFamily="18" charset="0"/>
+            </a:endParaRPr>
+          </a:p>
+          <a:p>
+            <a:pPr marL="285750" indent="-285750">
+              <a:buFont typeface="Arial" panose="020B0604020202020204" pitchFamily="34" charset="0"/>
+              <a:buChar char="•"/>
+            </a:pPr>
+            <a:r>
+              <a:rPr lang="en-US" sz="1600" dirty="0" smtClean="0">
+                <a:latin typeface="Georgia" panose="02040502050405020303" pitchFamily="18" charset="0"/>
+              </a:rPr>
+              <a:t>Must use the entire model</a:t>
+            </a:r>
+          </a:p>
+          <a:p>
+            <a:pPr marL="285750" indent="-285750">
+              <a:buFont typeface="Arial" panose="020B0604020202020204" pitchFamily="34" charset="0"/>
+              <a:buChar char="•"/>
+            </a:pPr>
+            <a:endParaRPr lang="en-US" sz="1600" dirty="0">
+              <a:latin typeface="Georgia" panose="02040502050405020303" pitchFamily="18" charset="0"/>
+            </a:endParaRPr>
+          </a:p>
+          <a:p>
+            <a:pPr marL="285750" indent="-285750">
+              <a:buFont typeface="Arial" panose="020B0604020202020204" pitchFamily="34" charset="0"/>
+              <a:buChar char="•"/>
+            </a:pPr>
+            <a:endParaRPr lang="en-US" sz="1600" dirty="0" smtClean="0">
+              <a:latin typeface="Georgia" panose="02040502050405020303" pitchFamily="18" charset="0"/>
+            </a:endParaRPr>
+          </a:p>
+        </p:txBody>
+      </p:sp>
+      <p:sp>
+        <p:nvSpPr>
+          <p:cNvPr id="3" name="AutoShape 2"/>
+          <p:cNvSpPr>
+            <a:spLocks noChangeAspect="1" noChangeArrowheads="1"/>
+          </p:cNvSpPr>
+          <p:nvPr/>
+        </p:nvSpPr>
+        <p:spPr bwMode="auto">
+          <a:xfrm>
+            <a:off x="63500" y="-136525"/>
+            <a:ext cx="304800" cy="304800"/>
+          </a:xfrm>
+          <a:prstGeom prst="rect">
+            <a:avLst/>
+          </a:prstGeom>
+          <a:noFill/>
+          <a:extLst>
+            <a:ext uri="{909E8E84-426E-40DD-AFC4-6F175D3DCCD1}">
+              <a14:hiddenFill xmlns:a14="http://schemas.microsoft.com/office/drawing/2010/main">
+                <a:solidFill>
+                  <a:srgbClr val="FFFFFF"/>
+                </a:solidFill>
+              </a14:hiddenFill>
+            </a:ext>
+          </a:extLst>
+        </p:spPr>
+        <p:txBody>
+          <a:bodyPr vert="horz" wrap="square" lIns="91440" tIns="45720" rIns="91440" bIns="45720" numCol="1" anchor="t" anchorCtr="0" compatLnSpc="1">
+            <a:prstTxWarp prst="textNoShape">
+              <a:avLst/>
+            </a:prstTxWarp>
+          </a:bodyPr>
+          <a:lstStyle/>
+          <a:p>
+            <a:endParaRPr lang="en-US"/>
           </a:p>
         </p:txBody>
       </p:sp>
       <p:pic>
         <p:nvPicPr>
-          <p:cNvPr id="4" name="Content Placeholder 3"/>
+          <p:cNvPr id="9" name="Content Placeholder 8"/>
           <p:cNvPicPr>
             <a:picLocks noGrp="1" noChangeAspect="1"/>
           </p:cNvPicPr>
@@ -11791,7 +12019,7 @@
           </p:nvPr>
         </p:nvPicPr>
         <p:blipFill>
-          <a:blip r:embed="rId2">
+          <a:blip r:embed="rId2" cstate="print">
             <a:extLst>
               <a:ext uri="{28A0092B-C50C-407E-A947-70E740481C1C}">
                 <a14:useLocalDpi xmlns:a14="http://schemas.microsoft.com/office/drawing/2010/main" val="0"/>
@@ -11804,175 +12032,75 @@
         </p:blipFill>
         <p:spPr>
           <a:xfrm>
-            <a:off x="457200" y="1944345"/>
-            <a:ext cx="5227319" cy="3733799"/>
+            <a:off x="215899" y="1523999"/>
+            <a:ext cx="2774127" cy="1981519"/>
           </a:xfrm>
-          <a:ln>
-            <a:solidFill>
-              <a:schemeClr val="tx1"/>
-            </a:solidFill>
-          </a:ln>
         </p:spPr>
       </p:pic>
-      <p:sp>
-        <p:nvSpPr>
-          <p:cNvPr id="6" name="TextBox 5"/>
-          <p:cNvSpPr txBox="1"/>
+      <p:pic>
+        <p:nvPicPr>
+          <p:cNvPr id="10" name="Picture 9"/>
+          <p:cNvPicPr>
+            <a:picLocks noChangeAspect="1"/>
+          </p:cNvPicPr>
           <p:nvPr/>
-        </p:nvSpPr>
+        </p:nvPicPr>
+        <p:blipFill>
+          <a:blip r:embed="rId3" cstate="print">
+            <a:extLst>
+              <a:ext uri="{28A0092B-C50C-407E-A947-70E740481C1C}">
+                <a14:useLocalDpi xmlns:a14="http://schemas.microsoft.com/office/drawing/2010/main" val="0"/>
+              </a:ext>
+            </a:extLst>
+          </a:blip>
+          <a:stretch>
+            <a:fillRect/>
+          </a:stretch>
+        </p:blipFill>
         <p:spPr>
           <a:xfrm>
-            <a:off x="5867400" y="1954410"/>
-            <a:ext cx="3048000" cy="4278094"/>
+            <a:off x="3096148" y="1524000"/>
+            <a:ext cx="2774127" cy="1981519"/>
           </a:xfrm>
           <a:prstGeom prst="rect">
             <a:avLst/>
           </a:prstGeom>
-          <a:noFill/>
         </p:spPr>
-        <p:txBody>
-          <a:bodyPr wrap="square" rtlCol="0">
-            <a:spAutoFit/>
-          </a:bodyPr>
-          <a:lstStyle/>
-          <a:p>
-            <a:pPr marL="285750" indent="-285750">
-              <a:buFont typeface="Arial" panose="020B0604020202020204" pitchFamily="34" charset="0"/>
-              <a:buChar char="•"/>
-            </a:pPr>
-            <a:r>
-              <a:rPr lang="en-US" sz="1600" dirty="0" smtClean="0">
-                <a:latin typeface="Georgia" panose="02040502050405020303" pitchFamily="18" charset="0"/>
-              </a:rPr>
-              <a:t>Safe City data set</a:t>
-            </a:r>
-          </a:p>
-          <a:p>
-            <a:pPr marL="285750" indent="-285750">
-              <a:buFont typeface="Arial" panose="020B0604020202020204" pitchFamily="34" charset="0"/>
-              <a:buChar char="•"/>
-            </a:pPr>
-            <a:endParaRPr lang="en-US" sz="1600" dirty="0" smtClean="0">
-              <a:latin typeface="Georgia" panose="02040502050405020303" pitchFamily="18" charset="0"/>
-            </a:endParaRPr>
-          </a:p>
-          <a:p>
-            <a:pPr marL="285750" indent="-285750">
-              <a:buFont typeface="Arial" panose="020B0604020202020204" pitchFamily="34" charset="0"/>
-              <a:buChar char="•"/>
-            </a:pPr>
-            <a:r>
-              <a:rPr lang="en-US" sz="1600" dirty="0" err="1">
-                <a:latin typeface="Georgia" panose="02040502050405020303" pitchFamily="18" charset="0"/>
-              </a:rPr>
-              <a:t>Adjr</a:t>
-            </a:r>
-            <a:r>
-              <a:rPr lang="en-US" sz="1600" dirty="0">
-                <a:latin typeface="Georgia" panose="02040502050405020303" pitchFamily="18" charset="0"/>
-              </a:rPr>
-              <a:t>. R2 is a measure of fit of our model to our data</a:t>
-            </a:r>
-          </a:p>
-          <a:p>
-            <a:pPr marL="285750" indent="-285750">
-              <a:buFont typeface="Arial" panose="020B0604020202020204" pitchFamily="34" charset="0"/>
-              <a:buChar char="•"/>
-            </a:pPr>
-            <a:endParaRPr lang="en-US" sz="1600" dirty="0">
-              <a:latin typeface="Georgia" panose="02040502050405020303" pitchFamily="18" charset="0"/>
-            </a:endParaRPr>
-          </a:p>
-          <a:p>
-            <a:pPr marL="285750" indent="-285750">
-              <a:buFont typeface="Arial" panose="020B0604020202020204" pitchFamily="34" charset="0"/>
-              <a:buChar char="•"/>
-            </a:pPr>
-            <a:r>
-              <a:rPr lang="en-US" sz="1600" dirty="0">
-                <a:latin typeface="Georgia" panose="02040502050405020303" pitchFamily="18" charset="0"/>
-              </a:rPr>
-              <a:t>Darker = better </a:t>
-            </a:r>
-            <a:r>
-              <a:rPr lang="en-US" sz="1600" dirty="0" smtClean="0">
-                <a:latin typeface="Georgia" panose="02040502050405020303" pitchFamily="18" charset="0"/>
-              </a:rPr>
-              <a:t>fit</a:t>
-            </a:r>
-            <a:endParaRPr lang="en-US" sz="1600" dirty="0">
-              <a:latin typeface="Georgia" panose="02040502050405020303" pitchFamily="18" charset="0"/>
-            </a:endParaRPr>
-          </a:p>
-          <a:p>
-            <a:pPr marL="285750" indent="-285750">
-              <a:buFont typeface="Arial" panose="020B0604020202020204" pitchFamily="34" charset="0"/>
-              <a:buChar char="•"/>
-            </a:pPr>
-            <a:endParaRPr lang="en-US" sz="1600" dirty="0">
-              <a:latin typeface="Georgia" panose="02040502050405020303" pitchFamily="18" charset="0"/>
-            </a:endParaRPr>
-          </a:p>
-          <a:p>
-            <a:pPr marL="285750" indent="-285750">
-              <a:buFont typeface="Arial" panose="020B0604020202020204" pitchFamily="34" charset="0"/>
-              <a:buChar char="•"/>
-            </a:pPr>
-            <a:r>
-              <a:rPr lang="en-US" sz="1600" dirty="0">
-                <a:latin typeface="Georgia" panose="02040502050405020303" pitchFamily="18" charset="0"/>
-              </a:rPr>
-              <a:t>More features ≠ better model</a:t>
-            </a:r>
-          </a:p>
-          <a:p>
-            <a:pPr marL="285750" indent="-285750">
-              <a:buFont typeface="Arial" panose="020B0604020202020204" pitchFamily="34" charset="0"/>
-              <a:buChar char="•"/>
-            </a:pPr>
-            <a:endParaRPr lang="en-US" sz="1600" dirty="0" smtClean="0">
-              <a:latin typeface="Georgia" panose="02040502050405020303" pitchFamily="18" charset="0"/>
-            </a:endParaRPr>
-          </a:p>
-          <a:p>
-            <a:pPr marL="285750" indent="-285750">
-              <a:buFont typeface="Arial" panose="020B0604020202020204" pitchFamily="34" charset="0"/>
-              <a:buChar char="•"/>
-            </a:pPr>
-            <a:r>
-              <a:rPr lang="en-US" sz="1600" dirty="0" smtClean="0">
-                <a:latin typeface="Georgia" panose="02040502050405020303" pitchFamily="18" charset="0"/>
-              </a:rPr>
-              <a:t>Optimal model =       Average College Cost + Median Debt +            Median Income +       College Retention Rate</a:t>
-            </a:r>
-          </a:p>
-          <a:p>
-            <a:pPr marL="285750" indent="-285750">
-              <a:buFont typeface="Arial" panose="020B0604020202020204" pitchFamily="34" charset="0"/>
-              <a:buChar char="•"/>
-            </a:pPr>
-            <a:endParaRPr lang="en-US" sz="1600" dirty="0">
-              <a:latin typeface="Georgia" panose="02040502050405020303" pitchFamily="18" charset="0"/>
-            </a:endParaRPr>
-          </a:p>
-          <a:p>
-            <a:pPr marL="285750" indent="-285750">
-              <a:buFont typeface="Arial" panose="020B0604020202020204" pitchFamily="34" charset="0"/>
-              <a:buChar char="•"/>
-            </a:pPr>
-            <a:r>
-              <a:rPr lang="en-US" sz="1600" dirty="0" smtClean="0">
-                <a:latin typeface="Georgia" panose="02040502050405020303" pitchFamily="18" charset="0"/>
-              </a:rPr>
-              <a:t>Why not choose “darkest”?</a:t>
-            </a:r>
-          </a:p>
-        </p:txBody>
-      </p:sp>
+      </p:pic>
+      <p:pic>
+        <p:nvPicPr>
+          <p:cNvPr id="11" name="Picture 10"/>
+          <p:cNvPicPr>
+            <a:picLocks noChangeAspect="1"/>
+          </p:cNvPicPr>
+          <p:nvPr/>
+        </p:nvPicPr>
+        <p:blipFill>
+          <a:blip r:embed="rId4" cstate="print">
+            <a:extLst>
+              <a:ext uri="{28A0092B-C50C-407E-A947-70E740481C1C}">
+                <a14:useLocalDpi xmlns:a14="http://schemas.microsoft.com/office/drawing/2010/main" val="0"/>
+              </a:ext>
+            </a:extLst>
+          </a:blip>
+          <a:stretch>
+            <a:fillRect/>
+          </a:stretch>
+        </p:blipFill>
+        <p:spPr>
+          <a:xfrm>
+            <a:off x="1711098" y="3724125"/>
+            <a:ext cx="2772113" cy="1980081"/>
+          </a:xfrm>
+          <a:prstGeom prst="rect">
+            <a:avLst/>
+          </a:prstGeom>
+        </p:spPr>
+      </p:pic>
     </p:spTree>
     <p:extLst>
       <p:ext uri="{BB962C8B-B14F-4D97-AF65-F5344CB8AC3E}">
-        <p14:creationId xmlns:p14="http://schemas.microsoft.com/office/powerpoint/2010/main" val="2614753767"/>
+        <p14:creationId xmlns:p14="http://schemas.microsoft.com/office/powerpoint/2010/main" val="4291763524"/>
       </p:ext>
     </p:extLst>
   </p:cSld>
@@ -12023,17 +12151,157 @@
           <a:p>
             <a:r>
               <a:rPr lang="en-US" dirty="0" smtClean="0"/>
-              <a:t>Model Generation</a:t>
+              <a:t>Results</a:t>
             </a:r>
             <a:endParaRPr lang="en-US" dirty="0">
               <a:latin typeface="Georgia" panose="02040502050405020303" pitchFamily="18" charset="0"/>
             </a:endParaRPr>
+          </a:p>
+        </p:txBody>
+      </p:sp>
+      <p:sp>
+        <p:nvSpPr>
+          <p:cNvPr id="6" name="TextBox 5"/>
+          <p:cNvSpPr txBox="1"/>
+          <p:nvPr/>
+        </p:nvSpPr>
+        <p:spPr>
+          <a:xfrm>
+            <a:off x="5867400" y="1954410"/>
+            <a:ext cx="3048000" cy="2800767"/>
+          </a:xfrm>
+          <a:prstGeom prst="rect">
+            <a:avLst/>
+          </a:prstGeom>
+          <a:noFill/>
+        </p:spPr>
+        <p:txBody>
+          <a:bodyPr wrap="square" rtlCol="0">
+            <a:spAutoFit/>
+          </a:bodyPr>
+          <a:lstStyle/>
+          <a:p>
+            <a:pPr marL="285750" indent="-285750">
+              <a:buFont typeface="Arial" panose="020B0604020202020204" pitchFamily="34" charset="0"/>
+              <a:buChar char="•"/>
+            </a:pPr>
+            <a:r>
+              <a:rPr lang="en-US" sz="1600" dirty="0" smtClean="0">
+                <a:latin typeface="Georgia" panose="02040502050405020303" pitchFamily="18" charset="0"/>
+              </a:rPr>
+              <a:t>Slight negative trend</a:t>
+            </a:r>
+          </a:p>
+          <a:p>
+            <a:pPr marL="285750" indent="-285750">
+              <a:buFont typeface="Arial" panose="020B0604020202020204" pitchFamily="34" charset="0"/>
+              <a:buChar char="•"/>
+            </a:pPr>
+            <a:endParaRPr lang="en-US" sz="1600" dirty="0">
+              <a:latin typeface="Georgia" panose="02040502050405020303" pitchFamily="18" charset="0"/>
+            </a:endParaRPr>
+          </a:p>
+          <a:p>
+            <a:pPr marL="285750" indent="-285750">
+              <a:buFont typeface="Arial" panose="020B0604020202020204" pitchFamily="34" charset="0"/>
+              <a:buChar char="•"/>
+            </a:pPr>
+            <a:r>
+              <a:rPr lang="en-US" sz="1600" dirty="0" smtClean="0">
+                <a:latin typeface="Georgia" panose="02040502050405020303" pitchFamily="18" charset="0"/>
+              </a:rPr>
+              <a:t>Increasing college graduation rate can decrease crime rate</a:t>
+            </a:r>
+          </a:p>
+          <a:p>
+            <a:pPr marL="285750" indent="-285750">
+              <a:buFont typeface="Arial" panose="020B0604020202020204" pitchFamily="34" charset="0"/>
+              <a:buChar char="•"/>
+            </a:pPr>
+            <a:endParaRPr lang="en-US" sz="1600" dirty="0">
+              <a:latin typeface="Georgia" panose="02040502050405020303" pitchFamily="18" charset="0"/>
+            </a:endParaRPr>
+          </a:p>
+          <a:p>
+            <a:pPr marL="285750" indent="-285750">
+              <a:buFont typeface="Arial" panose="020B0604020202020204" pitchFamily="34" charset="0"/>
+              <a:buChar char="•"/>
+            </a:pPr>
+            <a:r>
+              <a:rPr lang="en-US" sz="1600" dirty="0" smtClean="0">
+                <a:latin typeface="Georgia" panose="02040502050405020303" pitchFamily="18" charset="0"/>
+              </a:rPr>
+              <a:t>Example: Raising </a:t>
+            </a:r>
+            <a:r>
+              <a:rPr lang="en-US" sz="1600" dirty="0">
+                <a:latin typeface="Georgia" panose="02040502050405020303" pitchFamily="18" charset="0"/>
+              </a:rPr>
+              <a:t>grad rate by 50% decreases crime rate from 0.86% to 0.68%.</a:t>
+            </a:r>
+          </a:p>
+          <a:p>
+            <a:pPr marL="285750" indent="-285750">
+              <a:buFont typeface="Arial" panose="020B0604020202020204" pitchFamily="34" charset="0"/>
+              <a:buChar char="•"/>
+            </a:pPr>
+            <a:endParaRPr lang="en-US" sz="1600" dirty="0">
+              <a:latin typeface="Georgia" panose="02040502050405020303" pitchFamily="18" charset="0"/>
+            </a:endParaRPr>
+          </a:p>
+          <a:p>
+            <a:pPr marL="285750" indent="-285750">
+              <a:buFont typeface="Arial" panose="020B0604020202020204" pitchFamily="34" charset="0"/>
+              <a:buChar char="•"/>
+            </a:pPr>
+            <a:endParaRPr lang="en-US" sz="1600" dirty="0" smtClean="0">
+              <a:latin typeface="Georgia" panose="02040502050405020303" pitchFamily="18" charset="0"/>
+            </a:endParaRPr>
+          </a:p>
+        </p:txBody>
+      </p:sp>
+      <p:sp>
+        <p:nvSpPr>
+          <p:cNvPr id="3" name="AutoShape 2"/>
+          <p:cNvSpPr>
+            <a:spLocks noChangeAspect="1" noChangeArrowheads="1"/>
+          </p:cNvSpPr>
+          <p:nvPr/>
+        </p:nvSpPr>
+        <p:spPr bwMode="auto">
+          <a:xfrm>
+            <a:off x="63500" y="-136525"/>
+            <a:ext cx="304800" cy="304800"/>
+          </a:xfrm>
+          <a:prstGeom prst="rect">
+            <a:avLst/>
+          </a:prstGeom>
+          <a:noFill/>
+          <a:extLst>
+            <a:ext uri="{909E8E84-426E-40DD-AFC4-6F175D3DCCD1}">
+              <a14:hiddenFill xmlns:a14="http://schemas.microsoft.com/office/drawing/2010/main">
+                <a:solidFill>
+                  <a:srgbClr val="FFFFFF"/>
+                </a:solidFill>
+              </a14:hiddenFill>
+            </a:ext>
+          </a:extLst>
+        </p:spPr>
+        <p:txBody>
+          <a:bodyPr vert="horz" wrap="square" lIns="91440" tIns="45720" rIns="91440" bIns="45720" numCol="1" anchor="t" anchorCtr="0" compatLnSpc="1">
+            <a:prstTxWarp prst="textNoShape">
+              <a:avLst/>
+            </a:prstTxWarp>
+          </a:bodyPr>
+          <a:lstStyle/>
+          <a:p>
+            <a:endParaRPr lang="en-US"/>
           </a:p>
         </p:txBody>
       </p:sp>
       <p:pic>
         <p:nvPicPr>
-          <p:cNvPr id="4" name="Content Placeholder 3"/>
+          <p:cNvPr id="9" name="Content Placeholder 8"/>
           <p:cNvPicPr>
             <a:picLocks noGrp="1" noChangeAspect="1"/>
           </p:cNvPicPr>
@@ -12055,171 +12323,15 @@
         </p:blipFill>
         <p:spPr>
           <a:xfrm>
-            <a:off x="457201" y="1944345"/>
-            <a:ext cx="5227317" cy="3733798"/>
+            <a:off x="215898" y="1523999"/>
+            <a:ext cx="5575301" cy="3982357"/>
           </a:xfrm>
-          <a:ln>
-            <a:solidFill>
-              <a:schemeClr val="tx1"/>
-            </a:solidFill>
-          </a:ln>
         </p:spPr>
       </p:pic>
-      <p:sp>
-        <p:nvSpPr>
-          <p:cNvPr id="6" name="TextBox 5"/>
-          <p:cNvSpPr txBox="1"/>
-          <p:nvPr/>
-        </p:nvSpPr>
-        <p:spPr>
-          <a:xfrm>
-            <a:off x="5867400" y="1954410"/>
-            <a:ext cx="3048000" cy="4031873"/>
-          </a:xfrm>
-          <a:prstGeom prst="rect">
-            <a:avLst/>
-          </a:prstGeom>
-          <a:noFill/>
-        </p:spPr>
-        <p:txBody>
-          <a:bodyPr wrap="square" rtlCol="0">
-            <a:spAutoFit/>
-          </a:bodyPr>
-          <a:lstStyle/>
-          <a:p>
-            <a:pPr marL="285750" indent="-285750">
-              <a:buFont typeface="Arial" panose="020B0604020202020204" pitchFamily="34" charset="0"/>
-              <a:buChar char="•"/>
-            </a:pPr>
-            <a:r>
-              <a:rPr lang="en-US" sz="1600" dirty="0" smtClean="0">
-                <a:latin typeface="Georgia" panose="02040502050405020303" pitchFamily="18" charset="0"/>
-              </a:rPr>
-              <a:t>Individual trends of features relative to this model</a:t>
-            </a:r>
-          </a:p>
-          <a:p>
-            <a:pPr marL="285750" indent="-285750">
-              <a:buFont typeface="Arial" panose="020B0604020202020204" pitchFamily="34" charset="0"/>
-              <a:buChar char="•"/>
-            </a:pPr>
-            <a:endParaRPr lang="en-US" sz="1600" dirty="0">
-              <a:latin typeface="Georgia" panose="02040502050405020303" pitchFamily="18" charset="0"/>
-            </a:endParaRPr>
-          </a:p>
-          <a:p>
-            <a:pPr marL="285750" indent="-285750">
-              <a:buFont typeface="Arial" panose="020B0604020202020204" pitchFamily="34" charset="0"/>
-              <a:buChar char="•"/>
-            </a:pPr>
-            <a:r>
-              <a:rPr lang="en-US" sz="1600" dirty="0" smtClean="0">
-                <a:latin typeface="Georgia" panose="02040502050405020303" pitchFamily="18" charset="0"/>
-              </a:rPr>
-              <a:t>Visualize relative impact on model for VCR</a:t>
-            </a:r>
-          </a:p>
-          <a:p>
-            <a:pPr marL="285750" indent="-285750">
-              <a:buFont typeface="Arial" panose="020B0604020202020204" pitchFamily="34" charset="0"/>
-              <a:buChar char="•"/>
-            </a:pPr>
-            <a:endParaRPr lang="en-US" sz="1600" dirty="0">
-              <a:latin typeface="Georgia" panose="02040502050405020303" pitchFamily="18" charset="0"/>
-            </a:endParaRPr>
-          </a:p>
-          <a:p>
-            <a:pPr marL="285750" indent="-285750">
-              <a:buFont typeface="Arial" panose="020B0604020202020204" pitchFamily="34" charset="0"/>
-              <a:buChar char="•"/>
-            </a:pPr>
-            <a:r>
-              <a:rPr lang="en-US" sz="1600" dirty="0" smtClean="0">
-                <a:latin typeface="Georgia" panose="02040502050405020303" pitchFamily="18" charset="0"/>
-              </a:rPr>
-              <a:t>CAREFUL!</a:t>
-            </a:r>
-          </a:p>
-          <a:p>
-            <a:pPr marL="285750" indent="-285750">
-              <a:buFont typeface="Arial" panose="020B0604020202020204" pitchFamily="34" charset="0"/>
-              <a:buChar char="•"/>
-            </a:pPr>
-            <a:endParaRPr lang="en-US" sz="1600" dirty="0">
-              <a:latin typeface="Georgia" panose="02040502050405020303" pitchFamily="18" charset="0"/>
-            </a:endParaRPr>
-          </a:p>
-          <a:p>
-            <a:pPr marL="285750" indent="-285750">
-              <a:buFont typeface="Arial" panose="020B0604020202020204" pitchFamily="34" charset="0"/>
-              <a:buChar char="•"/>
-            </a:pPr>
-            <a:r>
-              <a:rPr lang="en-US" sz="1600" dirty="0" smtClean="0">
-                <a:latin typeface="Georgia" panose="02040502050405020303" pitchFamily="18" charset="0"/>
-              </a:rPr>
-              <a:t>Not to be extrapolated individually for unseen data</a:t>
-            </a:r>
-          </a:p>
-          <a:p>
-            <a:pPr marL="285750" indent="-285750">
-              <a:buFont typeface="Arial" panose="020B0604020202020204" pitchFamily="34" charset="0"/>
-              <a:buChar char="•"/>
-            </a:pPr>
-            <a:endParaRPr lang="en-US" sz="1600" dirty="0">
-              <a:latin typeface="Georgia" panose="02040502050405020303" pitchFamily="18" charset="0"/>
-            </a:endParaRPr>
-          </a:p>
-          <a:p>
-            <a:pPr marL="285750" indent="-285750">
-              <a:buFont typeface="Arial" panose="020B0604020202020204" pitchFamily="34" charset="0"/>
-              <a:buChar char="•"/>
-            </a:pPr>
-            <a:r>
-              <a:rPr lang="en-US" sz="1600" dirty="0" smtClean="0">
-                <a:latin typeface="Georgia" panose="02040502050405020303" pitchFamily="18" charset="0"/>
-              </a:rPr>
-              <a:t>Must use the entire model</a:t>
-            </a:r>
-          </a:p>
-          <a:p>
-            <a:pPr marL="285750" indent="-285750">
-              <a:buFont typeface="Arial" panose="020B0604020202020204" pitchFamily="34" charset="0"/>
-              <a:buChar char="•"/>
-            </a:pPr>
-            <a:endParaRPr lang="en-US" sz="1600" dirty="0">
-              <a:latin typeface="Georgia" panose="02040502050405020303" pitchFamily="18" charset="0"/>
-            </a:endParaRPr>
-          </a:p>
-          <a:p>
-            <a:endParaRPr lang="en-US" sz="1600" dirty="0" smtClean="0">
-              <a:latin typeface="Georgia" panose="02040502050405020303" pitchFamily="18" charset="0"/>
-            </a:endParaRPr>
-          </a:p>
-          <a:p>
-            <a:pPr marL="285750" indent="-285750">
-              <a:buFont typeface="Arial" panose="020B0604020202020204" pitchFamily="34" charset="0"/>
-              <a:buChar char="•"/>
-            </a:pPr>
-            <a:endParaRPr lang="en-US" sz="1600" dirty="0">
-              <a:latin typeface="Georgia" panose="02040502050405020303" pitchFamily="18" charset="0"/>
-            </a:endParaRPr>
-          </a:p>
-          <a:p>
-            <a:pPr marL="285750" indent="-285750">
-              <a:buFont typeface="Arial" panose="020B0604020202020204" pitchFamily="34" charset="0"/>
-              <a:buChar char="•"/>
-            </a:pPr>
-            <a:endParaRPr lang="en-US" sz="1600" dirty="0" smtClean="0">
-              <a:latin typeface="Georgia" panose="02040502050405020303" pitchFamily="18" charset="0"/>
-            </a:endParaRPr>
-          </a:p>
-        </p:txBody>
-      </p:sp>
     </p:spTree>
     <p:extLst>
       <p:ext uri="{BB962C8B-B14F-4D97-AF65-F5344CB8AC3E}">
-        <p14:creationId xmlns:p14="http://schemas.microsoft.com/office/powerpoint/2010/main" val="1502904721"/>
+        <p14:creationId xmlns:p14="http://schemas.microsoft.com/office/powerpoint/2010/main" val="4284085134"/>
       </p:ext>
     </p:extLst>
   </p:cSld>
@@ -12270,119 +12382,246 @@
           <a:p>
             <a:r>
               <a:rPr lang="en-US" dirty="0" smtClean="0"/>
-              <a:t>Conclusions</a:t>
-            </a:r>
-            <a:endParaRPr lang="en-US" dirty="0"/>
+              <a:t>Results</a:t>
+            </a:r>
+            <a:endParaRPr lang="en-US" dirty="0">
+              <a:latin typeface="Georgia" panose="02040502050405020303" pitchFamily="18" charset="0"/>
+            </a:endParaRPr>
           </a:p>
         </p:txBody>
       </p:sp>
       <p:sp>
         <p:nvSpPr>
-          <p:cNvPr id="3" name="Content Placeholder 2"/>
+          <p:cNvPr id="6" name="TextBox 5"/>
+          <p:cNvSpPr txBox="1"/>
+          <p:nvPr/>
+        </p:nvSpPr>
+        <p:spPr>
+          <a:xfrm>
+            <a:off x="5867400" y="1954410"/>
+            <a:ext cx="3048000" cy="3293209"/>
+          </a:xfrm>
+          <a:prstGeom prst="rect">
+            <a:avLst/>
+          </a:prstGeom>
+          <a:noFill/>
+        </p:spPr>
+        <p:txBody>
+          <a:bodyPr wrap="square" rtlCol="0">
+            <a:spAutoFit/>
+          </a:bodyPr>
+          <a:lstStyle/>
+          <a:p>
+            <a:pPr marL="285750" indent="-285750">
+              <a:buFont typeface="Arial" panose="020B0604020202020204" pitchFamily="34" charset="0"/>
+              <a:buChar char="•"/>
+            </a:pPr>
+            <a:r>
+              <a:rPr lang="en-US" sz="1600" dirty="0" smtClean="0">
+                <a:latin typeface="Georgia" panose="02040502050405020303" pitchFamily="18" charset="0"/>
+              </a:rPr>
+              <a:t>Slight positive trend</a:t>
+            </a:r>
+          </a:p>
+          <a:p>
+            <a:endParaRPr lang="en-US" sz="1600" dirty="0">
+              <a:latin typeface="Georgia" panose="02040502050405020303" pitchFamily="18" charset="0"/>
+            </a:endParaRPr>
+          </a:p>
+          <a:p>
+            <a:pPr marL="285750" indent="-285750">
+              <a:buFont typeface="Arial" panose="020B0604020202020204" pitchFamily="34" charset="0"/>
+              <a:buChar char="•"/>
+            </a:pPr>
+            <a:r>
+              <a:rPr lang="en-US" sz="1600" dirty="0" smtClean="0">
+                <a:latin typeface="Georgia" panose="02040502050405020303" pitchFamily="18" charset="0"/>
+              </a:rPr>
+              <a:t>Decreasing unemployment can decrease crime rate</a:t>
+            </a:r>
+          </a:p>
+          <a:p>
+            <a:pPr marL="285750" indent="-285750">
+              <a:buFont typeface="Arial" panose="020B0604020202020204" pitchFamily="34" charset="0"/>
+              <a:buChar char="•"/>
+            </a:pPr>
+            <a:endParaRPr lang="en-US" sz="1600" dirty="0">
+              <a:latin typeface="Georgia" panose="02040502050405020303" pitchFamily="18" charset="0"/>
+            </a:endParaRPr>
+          </a:p>
+          <a:p>
+            <a:pPr marL="285750" indent="-285750">
+              <a:buFont typeface="Arial" panose="020B0604020202020204" pitchFamily="34" charset="0"/>
+              <a:buChar char="•"/>
+            </a:pPr>
+            <a:r>
+              <a:rPr lang="en-US" sz="1600" dirty="0">
+                <a:latin typeface="Georgia" panose="02040502050405020303" pitchFamily="18" charset="0"/>
+              </a:rPr>
+              <a:t>Example: </a:t>
+            </a:r>
+            <a:r>
+              <a:rPr lang="en-US" sz="1600" dirty="0" smtClean="0">
+                <a:latin typeface="Georgia" panose="02040502050405020303" pitchFamily="18" charset="0"/>
+              </a:rPr>
+              <a:t>Lowering unemployment by </a:t>
+            </a:r>
+            <a:r>
+              <a:rPr lang="en-US" sz="1600" dirty="0">
+                <a:latin typeface="Georgia" panose="02040502050405020303" pitchFamily="18" charset="0"/>
+              </a:rPr>
+              <a:t>50% decreases crime rate from 0.86% to </a:t>
+            </a:r>
+            <a:r>
+              <a:rPr lang="en-US" sz="1600" dirty="0" smtClean="0">
+                <a:latin typeface="Georgia" panose="02040502050405020303" pitchFamily="18" charset="0"/>
+              </a:rPr>
+              <a:t>0.64%.</a:t>
+            </a:r>
+            <a:endParaRPr lang="en-US" sz="1600" dirty="0">
+              <a:latin typeface="Georgia" panose="02040502050405020303" pitchFamily="18" charset="0"/>
+            </a:endParaRPr>
+          </a:p>
+          <a:p>
+            <a:pPr marL="285750" indent="-285750">
+              <a:buFont typeface="Arial" panose="020B0604020202020204" pitchFamily="34" charset="0"/>
+              <a:buChar char="•"/>
+            </a:pPr>
+            <a:endParaRPr lang="en-US" sz="1600" dirty="0" smtClean="0">
+              <a:latin typeface="Georgia" panose="02040502050405020303" pitchFamily="18" charset="0"/>
+            </a:endParaRPr>
+          </a:p>
+          <a:p>
+            <a:pPr marL="285750" indent="-285750">
+              <a:buFont typeface="Arial" panose="020B0604020202020204" pitchFamily="34" charset="0"/>
+              <a:buChar char="•"/>
+            </a:pPr>
+            <a:endParaRPr lang="en-US" sz="1600" dirty="0">
+              <a:latin typeface="Georgia" panose="02040502050405020303" pitchFamily="18" charset="0"/>
+            </a:endParaRPr>
+          </a:p>
+          <a:p>
+            <a:pPr marL="285750" indent="-285750">
+              <a:buFont typeface="Arial" panose="020B0604020202020204" pitchFamily="34" charset="0"/>
+              <a:buChar char="•"/>
+            </a:pPr>
+            <a:endParaRPr lang="en-US" sz="1600" dirty="0">
+              <a:latin typeface="Georgia" panose="02040502050405020303" pitchFamily="18" charset="0"/>
+            </a:endParaRPr>
+          </a:p>
+          <a:p>
+            <a:pPr marL="285750" indent="-285750">
+              <a:buFont typeface="Arial" panose="020B0604020202020204" pitchFamily="34" charset="0"/>
+              <a:buChar char="•"/>
+            </a:pPr>
+            <a:endParaRPr lang="en-US" sz="1600" dirty="0" smtClean="0">
+              <a:latin typeface="Georgia" panose="02040502050405020303" pitchFamily="18" charset="0"/>
+            </a:endParaRPr>
+          </a:p>
+        </p:txBody>
+      </p:sp>
+      <p:sp>
+        <p:nvSpPr>
+          <p:cNvPr id="3" name="AutoShape 2"/>
           <p:cNvSpPr>
-            <a:spLocks noGrp="1"/>
+            <a:spLocks noChangeAspect="1" noChangeArrowheads="1"/>
           </p:cNvSpPr>
+          <p:nvPr/>
+        </p:nvSpPr>
+        <p:spPr bwMode="auto">
+          <a:xfrm>
+            <a:off x="63500" y="-136525"/>
+            <a:ext cx="304800" cy="304800"/>
+          </a:xfrm>
+          <a:prstGeom prst="rect">
+            <a:avLst/>
+          </a:prstGeom>
+          <a:noFill/>
+          <a:extLst>
+            <a:ext uri="{909E8E84-426E-40DD-AFC4-6F175D3DCCD1}">
+              <a14:hiddenFill xmlns:a14="http://schemas.microsoft.com/office/drawing/2010/main">
+                <a:solidFill>
+                  <a:srgbClr val="FFFFFF"/>
+                </a:solidFill>
+              </a14:hiddenFill>
+            </a:ext>
+          </a:extLst>
+        </p:spPr>
+        <p:txBody>
+          <a:bodyPr vert="horz" wrap="square" lIns="91440" tIns="45720" rIns="91440" bIns="45720" numCol="1" anchor="t" anchorCtr="0" compatLnSpc="1">
+            <a:prstTxWarp prst="textNoShape">
+              <a:avLst/>
+            </a:prstTxWarp>
+          </a:bodyPr>
+          <a:lstStyle/>
+          <a:p>
+            <a:endParaRPr lang="en-US"/>
+          </a:p>
+        </p:txBody>
+      </p:sp>
+      <p:pic>
+        <p:nvPicPr>
+          <p:cNvPr id="9" name="Content Placeholder 8"/>
+          <p:cNvPicPr>
+            <a:picLocks noGrp="1" noChangeAspect="1"/>
+          </p:cNvPicPr>
           <p:nvPr>
             <p:ph idx="1"/>
           </p:nvPr>
-        </p:nvSpPr>
-        <p:spPr/>
-        <p:txBody>
-          <a:bodyPr anchor="ctr">
-            <a:normAutofit/>
-          </a:bodyPr>
-          <a:lstStyle/>
-          <a:p>
-            <a:pPr marL="0" indent="0">
-              <a:buNone/>
-            </a:pPr>
-            <a:r>
-              <a:rPr lang="en-US" sz="2800" dirty="0" smtClean="0">
-                <a:latin typeface="Georgia" panose="02040502050405020303" pitchFamily="18" charset="0"/>
-                <a:cs typeface="Arial" panose="020B0604020202020204" pitchFamily="34" charset="0"/>
-              </a:rPr>
-              <a:t>Model Selection to Predict VCR</a:t>
-            </a:r>
-          </a:p>
-          <a:p>
-            <a:pPr lvl="1"/>
-            <a:r>
-              <a:rPr lang="en-US" dirty="0" smtClean="0">
-                <a:latin typeface="Georgia" panose="02040502050405020303" pitchFamily="18" charset="0"/>
-                <a:cs typeface="Arial" panose="020B0604020202020204" pitchFamily="34" charset="0"/>
-              </a:rPr>
-              <a:t>Underwent 4 different methods to validate strength of models</a:t>
-            </a:r>
-            <a:endParaRPr lang="en-US" dirty="0">
-              <a:latin typeface="Georgia" panose="02040502050405020303" pitchFamily="18" charset="0"/>
-              <a:cs typeface="Arial" panose="020B0604020202020204" pitchFamily="34" charset="0"/>
-            </a:endParaRPr>
-          </a:p>
-          <a:p>
-            <a:pPr lvl="1"/>
-            <a:r>
-              <a:rPr lang="en-US" dirty="0" smtClean="0">
-                <a:latin typeface="Georgia" panose="02040502050405020303" pitchFamily="18" charset="0"/>
-                <a:cs typeface="Arial" panose="020B0604020202020204" pitchFamily="34" charset="0"/>
-              </a:rPr>
-              <a:t>Model 5 for violent cities</a:t>
-            </a:r>
-          </a:p>
-          <a:p>
-            <a:pPr lvl="1"/>
-            <a:r>
-              <a:rPr lang="en-US" dirty="0" smtClean="0">
-                <a:latin typeface="Georgia" panose="02040502050405020303" pitchFamily="18" charset="0"/>
-                <a:cs typeface="Arial" panose="020B0604020202020204" pitchFamily="34" charset="0"/>
-              </a:rPr>
-              <a:t>Model 3 for safe cities</a:t>
-            </a:r>
-          </a:p>
-          <a:p>
-            <a:pPr lvl="1"/>
-            <a:endParaRPr lang="en-US" dirty="0">
-              <a:latin typeface="Georgia" panose="02040502050405020303" pitchFamily="18" charset="0"/>
-              <a:cs typeface="Arial" panose="020B0604020202020204" pitchFamily="34" charset="0"/>
-            </a:endParaRPr>
-          </a:p>
-          <a:p>
-            <a:pPr marL="0" indent="0">
-              <a:buNone/>
-            </a:pPr>
-            <a:r>
-              <a:rPr lang="en-US" sz="2800" dirty="0" smtClean="0">
-                <a:latin typeface="Georgia" panose="02040502050405020303" pitchFamily="18" charset="0"/>
-                <a:cs typeface="Arial" panose="020B0604020202020204" pitchFamily="34" charset="0"/>
-              </a:rPr>
-              <a:t>Hypothesis Check</a:t>
-            </a:r>
-          </a:p>
-          <a:p>
-            <a:pPr lvl="1"/>
-            <a:r>
-              <a:rPr lang="en-US" dirty="0" smtClean="0">
-                <a:latin typeface="Georgia" panose="02040502050405020303" pitchFamily="18" charset="0"/>
-                <a:cs typeface="Arial" panose="020B0604020202020204" pitchFamily="34" charset="0"/>
-              </a:rPr>
-              <a:t>Violent crime in violent cities is significantly impacted by unemployment rate, college graduation rate, and median debt of its population</a:t>
-            </a:r>
-          </a:p>
-          <a:p>
-            <a:pPr lvl="1"/>
-            <a:r>
-              <a:rPr lang="en-US" dirty="0" smtClean="0">
-                <a:latin typeface="Georgia" panose="02040502050405020303" pitchFamily="18" charset="0"/>
-                <a:cs typeface="Arial" panose="020B0604020202020204" pitchFamily="34" charset="0"/>
-              </a:rPr>
-              <a:t>Violent crime is safe cities is significantly impacted by median income, median debt, average cost of college, and retention rate of colleges</a:t>
-            </a:r>
-          </a:p>
-        </p:txBody>
-      </p:sp>
+        </p:nvPicPr>
+        <p:blipFill>
+          <a:blip r:embed="rId2">
+            <a:extLst>
+              <a:ext uri="{28A0092B-C50C-407E-A947-70E740481C1C}">
+                <a14:useLocalDpi xmlns:a14="http://schemas.microsoft.com/office/drawing/2010/main" val="0"/>
+              </a:ext>
+            </a:extLst>
+          </a:blip>
+          <a:stretch>
+            <a:fillRect/>
+          </a:stretch>
+        </p:blipFill>
+        <p:spPr>
+          <a:xfrm>
+            <a:off x="215898" y="1523999"/>
+            <a:ext cx="5575301" cy="3982357"/>
+          </a:xfrm>
+        </p:spPr>
+      </p:pic>
+      <p:pic>
+        <p:nvPicPr>
+          <p:cNvPr id="7" name="Picture 6"/>
+          <p:cNvPicPr>
+            <a:picLocks noChangeAspect="1"/>
+          </p:cNvPicPr>
+          <p:nvPr/>
+        </p:nvPicPr>
+        <p:blipFill>
+          <a:blip r:embed="rId3">
+            <a:extLst>
+              <a:ext uri="{28A0092B-C50C-407E-A947-70E740481C1C}">
+                <a14:useLocalDpi xmlns:a14="http://schemas.microsoft.com/office/drawing/2010/main" val="0"/>
+              </a:ext>
+            </a:extLst>
+          </a:blip>
+          <a:stretch>
+            <a:fillRect/>
+          </a:stretch>
+        </p:blipFill>
+        <p:spPr>
+          <a:xfrm>
+            <a:off x="237466" y="1524000"/>
+            <a:ext cx="5557777" cy="3969840"/>
+          </a:xfrm>
+          <a:prstGeom prst="rect">
+            <a:avLst/>
+          </a:prstGeom>
+        </p:spPr>
+      </p:pic>
     </p:spTree>
     <p:extLst>
       <p:ext uri="{BB962C8B-B14F-4D97-AF65-F5344CB8AC3E}">
-        <p14:creationId xmlns:p14="http://schemas.microsoft.com/office/powerpoint/2010/main" val="2239191880"/>
+        <p14:creationId xmlns:p14="http://schemas.microsoft.com/office/powerpoint/2010/main" val="2370833909"/>
       </p:ext>
     </p:extLst>
   </p:cSld>
@@ -12433,114 +12672,609 @@
           <a:p>
             <a:r>
               <a:rPr lang="en-US" dirty="0" smtClean="0"/>
-              <a:t>Recommendations</a:t>
-            </a:r>
-            <a:endParaRPr lang="en-US" dirty="0"/>
+              <a:t>Results</a:t>
+            </a:r>
+            <a:endParaRPr lang="en-US" dirty="0">
+              <a:latin typeface="Georgia" panose="02040502050405020303" pitchFamily="18" charset="0"/>
+            </a:endParaRPr>
           </a:p>
         </p:txBody>
       </p:sp>
       <p:sp>
         <p:nvSpPr>
-          <p:cNvPr id="3" name="Content Placeholder 2"/>
+          <p:cNvPr id="6" name="TextBox 5"/>
+          <p:cNvSpPr txBox="1"/>
+          <p:nvPr/>
+        </p:nvSpPr>
+        <p:spPr>
+          <a:xfrm>
+            <a:off x="5867400" y="1954410"/>
+            <a:ext cx="3048000" cy="3046988"/>
+          </a:xfrm>
+          <a:prstGeom prst="rect">
+            <a:avLst/>
+          </a:prstGeom>
+          <a:noFill/>
+        </p:spPr>
+        <p:txBody>
+          <a:bodyPr wrap="square" rtlCol="0">
+            <a:spAutoFit/>
+          </a:bodyPr>
+          <a:lstStyle/>
+          <a:p>
+            <a:pPr marL="285750" indent="-285750">
+              <a:buFont typeface="Arial" panose="020B0604020202020204" pitchFamily="34" charset="0"/>
+              <a:buChar char="•"/>
+            </a:pPr>
+            <a:r>
+              <a:rPr lang="en-US" sz="1600" dirty="0" smtClean="0">
+                <a:latin typeface="Georgia" panose="02040502050405020303" pitchFamily="18" charset="0"/>
+              </a:rPr>
+              <a:t>Slight positive trend</a:t>
+            </a:r>
+          </a:p>
+          <a:p>
+            <a:endParaRPr lang="en-US" sz="1600" dirty="0">
+              <a:latin typeface="Georgia" panose="02040502050405020303" pitchFamily="18" charset="0"/>
+            </a:endParaRPr>
+          </a:p>
+          <a:p>
+            <a:pPr marL="285750" indent="-285750">
+              <a:buFont typeface="Arial" panose="020B0604020202020204" pitchFamily="34" charset="0"/>
+              <a:buChar char="•"/>
+            </a:pPr>
+            <a:r>
+              <a:rPr lang="en-US" sz="1600" dirty="0" smtClean="0">
+                <a:latin typeface="Georgia" panose="02040502050405020303" pitchFamily="18" charset="0"/>
+              </a:rPr>
+              <a:t>Decreasing debt can decrease crime rate</a:t>
+            </a:r>
+          </a:p>
+          <a:p>
+            <a:pPr marL="285750" indent="-285750">
+              <a:buFont typeface="Arial" panose="020B0604020202020204" pitchFamily="34" charset="0"/>
+              <a:buChar char="•"/>
+            </a:pPr>
+            <a:endParaRPr lang="en-US" sz="1600" dirty="0">
+              <a:latin typeface="Georgia" panose="02040502050405020303" pitchFamily="18" charset="0"/>
+            </a:endParaRPr>
+          </a:p>
+          <a:p>
+            <a:pPr marL="285750" indent="-285750">
+              <a:buFont typeface="Arial" panose="020B0604020202020204" pitchFamily="34" charset="0"/>
+              <a:buChar char="•"/>
+            </a:pPr>
+            <a:r>
+              <a:rPr lang="en-US" sz="1600" dirty="0">
+                <a:latin typeface="Georgia" panose="02040502050405020303" pitchFamily="18" charset="0"/>
+              </a:rPr>
+              <a:t>Example: </a:t>
+            </a:r>
+            <a:r>
+              <a:rPr lang="en-US" sz="1600" dirty="0" smtClean="0">
+                <a:latin typeface="Georgia" panose="02040502050405020303" pitchFamily="18" charset="0"/>
+              </a:rPr>
+              <a:t>Lowering debt by </a:t>
+            </a:r>
+            <a:r>
+              <a:rPr lang="en-US" sz="1600" dirty="0">
+                <a:latin typeface="Georgia" panose="02040502050405020303" pitchFamily="18" charset="0"/>
+              </a:rPr>
+              <a:t>50% decreases crime rate from 0.86% to </a:t>
+            </a:r>
+            <a:r>
+              <a:rPr lang="en-US" sz="1600" dirty="0" smtClean="0">
+                <a:latin typeface="Georgia" panose="02040502050405020303" pitchFamily="18" charset="0"/>
+              </a:rPr>
+              <a:t>0.67%.</a:t>
+            </a:r>
+            <a:endParaRPr lang="en-US" sz="1600" dirty="0">
+              <a:latin typeface="Georgia" panose="02040502050405020303" pitchFamily="18" charset="0"/>
+            </a:endParaRPr>
+          </a:p>
+          <a:p>
+            <a:pPr marL="285750" indent="-285750">
+              <a:buFont typeface="Arial" panose="020B0604020202020204" pitchFamily="34" charset="0"/>
+              <a:buChar char="•"/>
+            </a:pPr>
+            <a:endParaRPr lang="en-US" sz="1600" dirty="0" smtClean="0">
+              <a:latin typeface="Georgia" panose="02040502050405020303" pitchFamily="18" charset="0"/>
+            </a:endParaRPr>
+          </a:p>
+          <a:p>
+            <a:pPr marL="285750" indent="-285750">
+              <a:buFont typeface="Arial" panose="020B0604020202020204" pitchFamily="34" charset="0"/>
+              <a:buChar char="•"/>
+            </a:pPr>
+            <a:endParaRPr lang="en-US" sz="1600" dirty="0">
+              <a:latin typeface="Georgia" panose="02040502050405020303" pitchFamily="18" charset="0"/>
+            </a:endParaRPr>
+          </a:p>
+          <a:p>
+            <a:pPr marL="285750" indent="-285750">
+              <a:buFont typeface="Arial" panose="020B0604020202020204" pitchFamily="34" charset="0"/>
+              <a:buChar char="•"/>
+            </a:pPr>
+            <a:endParaRPr lang="en-US" sz="1600" dirty="0">
+              <a:latin typeface="Georgia" panose="02040502050405020303" pitchFamily="18" charset="0"/>
+            </a:endParaRPr>
+          </a:p>
+          <a:p>
+            <a:pPr marL="285750" indent="-285750">
+              <a:buFont typeface="Arial" panose="020B0604020202020204" pitchFamily="34" charset="0"/>
+              <a:buChar char="•"/>
+            </a:pPr>
+            <a:endParaRPr lang="en-US" sz="1600" dirty="0" smtClean="0">
+              <a:latin typeface="Georgia" panose="02040502050405020303" pitchFamily="18" charset="0"/>
+            </a:endParaRPr>
+          </a:p>
+        </p:txBody>
+      </p:sp>
+      <p:sp>
+        <p:nvSpPr>
+          <p:cNvPr id="3" name="AutoShape 2"/>
+          <p:cNvSpPr>
+            <a:spLocks noChangeAspect="1" noChangeArrowheads="1"/>
+          </p:cNvSpPr>
+          <p:nvPr/>
+        </p:nvSpPr>
+        <p:spPr bwMode="auto">
+          <a:xfrm>
+            <a:off x="63500" y="-136525"/>
+            <a:ext cx="304800" cy="304800"/>
+          </a:xfrm>
+          <a:prstGeom prst="rect">
+            <a:avLst/>
+          </a:prstGeom>
+          <a:noFill/>
+          <a:extLst>
+            <a:ext uri="{909E8E84-426E-40DD-AFC4-6F175D3DCCD1}">
+              <a14:hiddenFill xmlns:a14="http://schemas.microsoft.com/office/drawing/2010/main">
+                <a:solidFill>
+                  <a:srgbClr val="FFFFFF"/>
+                </a:solidFill>
+              </a14:hiddenFill>
+            </a:ext>
+          </a:extLst>
+        </p:spPr>
+        <p:txBody>
+          <a:bodyPr vert="horz" wrap="square" lIns="91440" tIns="45720" rIns="91440" bIns="45720" numCol="1" anchor="t" anchorCtr="0" compatLnSpc="1">
+            <a:prstTxWarp prst="textNoShape">
+              <a:avLst/>
+            </a:prstTxWarp>
+          </a:bodyPr>
+          <a:lstStyle/>
+          <a:p>
+            <a:endParaRPr lang="en-US"/>
+          </a:p>
+        </p:txBody>
+      </p:sp>
+      <p:pic>
+        <p:nvPicPr>
+          <p:cNvPr id="9" name="Content Placeholder 8"/>
+          <p:cNvPicPr>
+            <a:picLocks noGrp="1" noChangeAspect="1"/>
+          </p:cNvPicPr>
+          <p:nvPr>
+            <p:ph idx="1"/>
+          </p:nvPr>
+        </p:nvPicPr>
+        <p:blipFill>
+          <a:blip r:embed="rId2">
+            <a:extLst>
+              <a:ext uri="{28A0092B-C50C-407E-A947-70E740481C1C}">
+                <a14:useLocalDpi xmlns:a14="http://schemas.microsoft.com/office/drawing/2010/main" val="0"/>
+              </a:ext>
+            </a:extLst>
+          </a:blip>
+          <a:stretch>
+            <a:fillRect/>
+          </a:stretch>
+        </p:blipFill>
+        <p:spPr>
+          <a:xfrm>
+            <a:off x="215898" y="1523999"/>
+            <a:ext cx="5575301" cy="3982357"/>
+          </a:xfrm>
+        </p:spPr>
+      </p:pic>
+      <p:pic>
+        <p:nvPicPr>
+          <p:cNvPr id="7" name="Picture 6"/>
+          <p:cNvPicPr>
+            <a:picLocks noChangeAspect="1"/>
+          </p:cNvPicPr>
+          <p:nvPr/>
+        </p:nvPicPr>
+        <p:blipFill>
+          <a:blip r:embed="rId3">
+            <a:extLst>
+              <a:ext uri="{28A0092B-C50C-407E-A947-70E740481C1C}">
+                <a14:useLocalDpi xmlns:a14="http://schemas.microsoft.com/office/drawing/2010/main" val="0"/>
+              </a:ext>
+            </a:extLst>
+          </a:blip>
+          <a:stretch>
+            <a:fillRect/>
+          </a:stretch>
+        </p:blipFill>
+        <p:spPr>
+          <a:xfrm>
+            <a:off x="237466" y="1524000"/>
+            <a:ext cx="5557776" cy="3969840"/>
+          </a:xfrm>
+          <a:prstGeom prst="rect">
+            <a:avLst/>
+          </a:prstGeom>
+        </p:spPr>
+      </p:pic>
+    </p:spTree>
+    <p:extLst>
+      <p:ext uri="{BB962C8B-B14F-4D97-AF65-F5344CB8AC3E}">
+        <p14:creationId xmlns:p14="http://schemas.microsoft.com/office/powerpoint/2010/main" val="1112387342"/>
+      </p:ext>
+    </p:extLst>
+  </p:cSld>
+  <p:clrMapOvr>
+    <a:masterClrMapping/>
+  </p:clrMapOvr>
+  <p:timing>
+    <p:tnLst>
+      <p:par>
+        <p:cTn id="1" dur="indefinite" restart="never" nodeType="tmRoot"/>
+      </p:par>
+    </p:tnLst>
+  </p:timing>
+</p:sld>
+</file>
+
+<file path=ppt/slides/slide19.xml><?xml version="1.0" encoding="utf-8"?>
+<p:sld xmlns:a="http://schemas.openxmlformats.org/drawingml/2006/main" xmlns:r="http://schemas.openxmlformats.org/officeDocument/2006/relationships" xmlns:p="http://schemas.openxmlformats.org/presentationml/2006/main" showMasterSp="0">
+  <p:cSld>
+    <p:spTree>
+      <p:nvGrpSpPr>
+        <p:cNvPr id="1" name=""/>
+        <p:cNvGrpSpPr/>
+        <p:nvPr/>
+      </p:nvGrpSpPr>
+      <p:grpSpPr>
+        <a:xfrm>
+          <a:off x="0" y="0"/>
+          <a:ext cx="0" cy="0"/>
+          <a:chOff x="0" y="0"/>
+          <a:chExt cx="0" cy="0"/>
+        </a:xfrm>
+      </p:grpSpPr>
+      <p:sp>
+        <p:nvSpPr>
+          <p:cNvPr id="2" name="Title 1"/>
           <p:cNvSpPr>
             <a:spLocks noGrp="1"/>
           </p:cNvSpPr>
           <p:nvPr>
-            <p:ph idx="1"/>
+            <p:ph type="title"/>
           </p:nvPr>
         </p:nvSpPr>
         <p:spPr/>
         <p:txBody>
-          <a:bodyPr anchor="ctr">
-            <a:normAutofit/>
+          <a:bodyPr anchor="ctr"/>
+          <a:lstStyle/>
+          <a:p>
+            <a:r>
+              <a:rPr lang="en-US" dirty="0" smtClean="0"/>
+              <a:t>Results</a:t>
+            </a:r>
+            <a:endParaRPr lang="en-US" dirty="0">
+              <a:latin typeface="Georgia" panose="02040502050405020303" pitchFamily="18" charset="0"/>
+            </a:endParaRPr>
+          </a:p>
+        </p:txBody>
+      </p:sp>
+      <p:sp>
+        <p:nvSpPr>
+          <p:cNvPr id="6" name="TextBox 5"/>
+          <p:cNvSpPr txBox="1"/>
+          <p:nvPr/>
+        </p:nvSpPr>
+        <p:spPr>
+          <a:xfrm>
+            <a:off x="5867400" y="1954410"/>
+            <a:ext cx="3048000" cy="4031873"/>
+          </a:xfrm>
+          <a:prstGeom prst="rect">
+            <a:avLst/>
+          </a:prstGeom>
+          <a:noFill/>
+        </p:spPr>
+        <p:txBody>
+          <a:bodyPr wrap="square" rtlCol="0">
+            <a:spAutoFit/>
           </a:bodyPr>
           <a:lstStyle/>
           <a:p>
-            <a:pPr marL="0" indent="0">
-              <a:buNone/>
+            <a:pPr marL="285750" indent="-285750">
+              <a:buFont typeface="Arial" panose="020B0604020202020204" pitchFamily="34" charset="0"/>
+              <a:buChar char="•"/>
             </a:pPr>
             <a:r>
-              <a:rPr lang="en-US" sz="2800" dirty="0" smtClean="0">
+              <a:rPr lang="en-US" sz="1600" dirty="0" smtClean="0">
                 <a:latin typeface="Georgia" panose="02040502050405020303" pitchFamily="18" charset="0"/>
-                <a:cs typeface="Arial" panose="020B0604020202020204" pitchFamily="34" charset="0"/>
               </a:rPr>
-              <a:t>Policy</a:t>
-            </a:r>
-            <a:endParaRPr lang="en-US" dirty="0" smtClean="0">
+              <a:t>Use Model 3 for safe cities</a:t>
+            </a:r>
+            <a:endParaRPr lang="en-US" sz="1600" dirty="0" smtClean="0">
               <a:latin typeface="Georgia" panose="02040502050405020303" pitchFamily="18" charset="0"/>
-              <a:cs typeface="Arial" panose="020B0604020202020204" pitchFamily="34" charset="0"/>
             </a:endParaRPr>
           </a:p>
           <a:p>
-            <a:pPr lvl="1"/>
-            <a:r>
-              <a:rPr lang="en-US" dirty="0" smtClean="0">
+            <a:pPr marL="285750" indent="-285750">
+              <a:buFont typeface="Arial" panose="020B0604020202020204" pitchFamily="34" charset="0"/>
+              <a:buChar char="•"/>
+            </a:pPr>
+            <a:endParaRPr lang="en-US" sz="1600" dirty="0">
+              <a:latin typeface="Georgia" panose="02040502050405020303" pitchFamily="18" charset="0"/>
+            </a:endParaRPr>
+          </a:p>
+          <a:p>
+            <a:pPr marL="285750" indent="-285750">
+              <a:buFont typeface="Arial" panose="020B0604020202020204" pitchFamily="34" charset="0"/>
+              <a:buChar char="•"/>
+            </a:pPr>
+            <a:r>
+              <a:rPr lang="en-US" sz="1600" dirty="0" smtClean="0">
                 <a:latin typeface="Georgia" panose="02040502050405020303" pitchFamily="18" charset="0"/>
-                <a:cs typeface="Arial" panose="020B0604020202020204" pitchFamily="34" charset="0"/>
               </a:rPr>
-              <a:t>Collect more data on job and educational opportunities to create a more robust model</a:t>
-            </a:r>
-          </a:p>
-          <a:p>
-            <a:pPr lvl="1"/>
-            <a:r>
-              <a:rPr lang="en-US" dirty="0">
+              <a:t>Median Income,         Median Debt,               College Retention Rate,  Cost of College</a:t>
+            </a:r>
+            <a:endParaRPr lang="en-US" sz="1600" dirty="0">
+              <a:latin typeface="Georgia" panose="02040502050405020303" pitchFamily="18" charset="0"/>
+            </a:endParaRPr>
+          </a:p>
+          <a:p>
+            <a:pPr marL="285750" indent="-285750">
+              <a:buFont typeface="Arial" panose="020B0604020202020204" pitchFamily="34" charset="0"/>
+              <a:buChar char="•"/>
+            </a:pPr>
+            <a:endParaRPr lang="en-US" sz="1600" dirty="0">
+              <a:latin typeface="Georgia" panose="02040502050405020303" pitchFamily="18" charset="0"/>
+            </a:endParaRPr>
+          </a:p>
+          <a:p>
+            <a:pPr marL="285750" indent="-285750">
+              <a:buFont typeface="Arial" panose="020B0604020202020204" pitchFamily="34" charset="0"/>
+              <a:buChar char="•"/>
+            </a:pPr>
+            <a:r>
+              <a:rPr lang="en-US" sz="1600" dirty="0">
                 <a:latin typeface="Georgia" panose="02040502050405020303" pitchFamily="18" charset="0"/>
-                <a:cs typeface="Arial" panose="020B0604020202020204" pitchFamily="34" charset="0"/>
               </a:rPr>
-              <a:t>Determine where your cities lies based on its violent crime rate</a:t>
-            </a:r>
-          </a:p>
-          <a:p>
-            <a:pPr lvl="1"/>
-            <a:r>
-              <a:rPr lang="en-US" dirty="0" smtClean="0">
+              <a:t>*Assumptions of the features</a:t>
+            </a:r>
+          </a:p>
+          <a:p>
+            <a:pPr marL="285750" indent="-285750">
+              <a:buFont typeface="Arial" panose="020B0604020202020204" pitchFamily="34" charset="0"/>
+              <a:buChar char="•"/>
+            </a:pPr>
+            <a:endParaRPr lang="en-US" sz="1600" dirty="0">
+              <a:latin typeface="Georgia" panose="02040502050405020303" pitchFamily="18" charset="0"/>
+            </a:endParaRPr>
+          </a:p>
+          <a:p>
+            <a:pPr marL="285750" indent="-285750">
+              <a:buFont typeface="Arial" panose="020B0604020202020204" pitchFamily="34" charset="0"/>
+              <a:buChar char="•"/>
+            </a:pPr>
+            <a:r>
+              <a:rPr lang="en-US" sz="1600" dirty="0">
                 <a:latin typeface="Georgia" panose="02040502050405020303" pitchFamily="18" charset="0"/>
-                <a:cs typeface="Arial" panose="020B0604020202020204" pitchFamily="34" charset="0"/>
               </a:rPr>
-              <a:t>Budget for more preventative measures in addition to law enforcement</a:t>
-            </a:r>
-          </a:p>
-          <a:p>
-            <a:pPr lvl="1"/>
-            <a:r>
-              <a:rPr lang="en-US" dirty="0" smtClean="0">
+              <a:t>Not to be extrapolated individually for unseen data</a:t>
+            </a:r>
+          </a:p>
+          <a:p>
+            <a:pPr marL="285750" indent="-285750">
+              <a:buFont typeface="Arial" panose="020B0604020202020204" pitchFamily="34" charset="0"/>
+              <a:buChar char="•"/>
+            </a:pPr>
+            <a:endParaRPr lang="en-US" sz="1600" dirty="0">
+              <a:latin typeface="Georgia" panose="02040502050405020303" pitchFamily="18" charset="0"/>
+            </a:endParaRPr>
+          </a:p>
+          <a:p>
+            <a:pPr marL="285750" indent="-285750">
+              <a:buFont typeface="Arial" panose="020B0604020202020204" pitchFamily="34" charset="0"/>
+              <a:buChar char="•"/>
+            </a:pPr>
+            <a:r>
+              <a:rPr lang="en-US" sz="1600" dirty="0">
                 <a:latin typeface="Georgia" panose="02040502050405020303" pitchFamily="18" charset="0"/>
-                <a:cs typeface="Arial" panose="020B0604020202020204" pitchFamily="34" charset="0"/>
               </a:rPr>
-              <a:t>Improve the job market, reduce the cost of education, reduce the incentive to be in debt, </a:t>
-            </a:r>
-          </a:p>
-          <a:p>
-            <a:pPr lvl="1"/>
-            <a:r>
-              <a:rPr lang="en-US" dirty="0" smtClean="0">
-                <a:latin typeface="Georgia" panose="02040502050405020303" pitchFamily="18" charset="0"/>
-                <a:cs typeface="Arial" panose="020B0604020202020204" pitchFamily="34" charset="0"/>
-              </a:rPr>
-              <a:t>Look to answer different questions with different machine learning models</a:t>
-            </a:r>
-          </a:p>
-          <a:p>
-            <a:pPr lvl="1"/>
-            <a:r>
-              <a:rPr lang="en-US" dirty="0" smtClean="0">
-                <a:latin typeface="Georgia" panose="02040502050405020303" pitchFamily="18" charset="0"/>
-                <a:cs typeface="Arial" panose="020B0604020202020204" pitchFamily="34" charset="0"/>
-              </a:rPr>
-              <a:t>Base policy on data-driven analysis over ideological dogma</a:t>
-            </a:r>
-            <a:endParaRPr lang="en-US" dirty="0">
+              <a:t>Must use the entire model</a:t>
+            </a:r>
+          </a:p>
+          <a:p>
+            <a:pPr marL="285750" indent="-285750">
+              <a:buFont typeface="Arial" panose="020B0604020202020204" pitchFamily="34" charset="0"/>
+              <a:buChar char="•"/>
+            </a:pPr>
+            <a:endParaRPr lang="en-US" sz="1600" dirty="0">
               <a:latin typeface="Georgia" panose="02040502050405020303" pitchFamily="18" charset="0"/>
-              <a:cs typeface="Arial" panose="020B0604020202020204" pitchFamily="34" charset="0"/>
+            </a:endParaRPr>
+          </a:p>
+          <a:p>
+            <a:pPr marL="285750" indent="-285750">
+              <a:buFont typeface="Arial" panose="020B0604020202020204" pitchFamily="34" charset="0"/>
+              <a:buChar char="•"/>
+            </a:pPr>
+            <a:endParaRPr lang="en-US" sz="1600" dirty="0" smtClean="0">
+              <a:latin typeface="Georgia" panose="02040502050405020303" pitchFamily="18" charset="0"/>
             </a:endParaRPr>
           </a:p>
         </p:txBody>
       </p:sp>
+      <p:sp>
+        <p:nvSpPr>
+          <p:cNvPr id="3" name="AutoShape 2"/>
+          <p:cNvSpPr>
+            <a:spLocks noChangeAspect="1" noChangeArrowheads="1"/>
+          </p:cNvSpPr>
+          <p:nvPr/>
+        </p:nvSpPr>
+        <p:spPr bwMode="auto">
+          <a:xfrm>
+            <a:off x="63500" y="-136525"/>
+            <a:ext cx="304800" cy="304800"/>
+          </a:xfrm>
+          <a:prstGeom prst="rect">
+            <a:avLst/>
+          </a:prstGeom>
+          <a:noFill/>
+          <a:extLst>
+            <a:ext uri="{909E8E84-426E-40DD-AFC4-6F175D3DCCD1}">
+              <a14:hiddenFill xmlns:a14="http://schemas.microsoft.com/office/drawing/2010/main">
+                <a:solidFill>
+                  <a:srgbClr val="FFFFFF"/>
+                </a:solidFill>
+              </a14:hiddenFill>
+            </a:ext>
+          </a:extLst>
+        </p:spPr>
+        <p:txBody>
+          <a:bodyPr vert="horz" wrap="square" lIns="91440" tIns="45720" rIns="91440" bIns="45720" numCol="1" anchor="t" anchorCtr="0" compatLnSpc="1">
+            <a:prstTxWarp prst="textNoShape">
+              <a:avLst/>
+            </a:prstTxWarp>
+          </a:bodyPr>
+          <a:lstStyle/>
+          <a:p>
+            <a:endParaRPr lang="en-US"/>
+          </a:p>
+        </p:txBody>
+      </p:sp>
+      <p:pic>
+        <p:nvPicPr>
+          <p:cNvPr id="9" name="Content Placeholder 8"/>
+          <p:cNvPicPr>
+            <a:picLocks noGrp="1" noChangeAspect="1"/>
+          </p:cNvPicPr>
+          <p:nvPr>
+            <p:ph idx="1"/>
+          </p:nvPr>
+        </p:nvPicPr>
+        <p:blipFill>
+          <a:blip r:embed="rId2" cstate="print">
+            <a:extLst>
+              <a:ext uri="{28A0092B-C50C-407E-A947-70E740481C1C}">
+                <a14:useLocalDpi xmlns:a14="http://schemas.microsoft.com/office/drawing/2010/main" val="0"/>
+              </a:ext>
+            </a:extLst>
+          </a:blip>
+          <a:stretch>
+            <a:fillRect/>
+          </a:stretch>
+        </p:blipFill>
+        <p:spPr>
+          <a:xfrm>
+            <a:off x="215899" y="1523999"/>
+            <a:ext cx="2774126" cy="1981519"/>
+          </a:xfrm>
+        </p:spPr>
+      </p:pic>
+      <p:pic>
+        <p:nvPicPr>
+          <p:cNvPr id="10" name="Picture 9"/>
+          <p:cNvPicPr>
+            <a:picLocks noChangeAspect="1"/>
+          </p:cNvPicPr>
+          <p:nvPr/>
+        </p:nvPicPr>
+        <p:blipFill>
+          <a:blip r:embed="rId3" cstate="print">
+            <a:extLst>
+              <a:ext uri="{28A0092B-C50C-407E-A947-70E740481C1C}">
+                <a14:useLocalDpi xmlns:a14="http://schemas.microsoft.com/office/drawing/2010/main" val="0"/>
+              </a:ext>
+            </a:extLst>
+          </a:blip>
+          <a:stretch>
+            <a:fillRect/>
+          </a:stretch>
+        </p:blipFill>
+        <p:spPr>
+          <a:xfrm>
+            <a:off x="3096148" y="1524000"/>
+            <a:ext cx="2774126" cy="1981519"/>
+          </a:xfrm>
+          <a:prstGeom prst="rect">
+            <a:avLst/>
+          </a:prstGeom>
+        </p:spPr>
+      </p:pic>
+      <p:pic>
+        <p:nvPicPr>
+          <p:cNvPr id="11" name="Picture 10"/>
+          <p:cNvPicPr>
+            <a:picLocks noChangeAspect="1"/>
+          </p:cNvPicPr>
+          <p:nvPr/>
+        </p:nvPicPr>
+        <p:blipFill>
+          <a:blip r:embed="rId4" cstate="print">
+            <a:extLst>
+              <a:ext uri="{28A0092B-C50C-407E-A947-70E740481C1C}">
+                <a14:useLocalDpi xmlns:a14="http://schemas.microsoft.com/office/drawing/2010/main" val="0"/>
+              </a:ext>
+            </a:extLst>
+          </a:blip>
+          <a:stretch>
+            <a:fillRect/>
+          </a:stretch>
+        </p:blipFill>
+        <p:spPr>
+          <a:xfrm>
+            <a:off x="215900" y="3724125"/>
+            <a:ext cx="2772113" cy="1980080"/>
+          </a:xfrm>
+          <a:prstGeom prst="rect">
+            <a:avLst/>
+          </a:prstGeom>
+        </p:spPr>
+      </p:pic>
+      <p:pic>
+        <p:nvPicPr>
+          <p:cNvPr id="8" name="Picture 7"/>
+          <p:cNvPicPr>
+            <a:picLocks noChangeAspect="1"/>
+          </p:cNvPicPr>
+          <p:nvPr/>
+        </p:nvPicPr>
+        <p:blipFill>
+          <a:blip r:embed="rId5" cstate="print">
+            <a:extLst>
+              <a:ext uri="{28A0092B-C50C-407E-A947-70E740481C1C}">
+                <a14:useLocalDpi xmlns:a14="http://schemas.microsoft.com/office/drawing/2010/main" val="0"/>
+              </a:ext>
+            </a:extLst>
+          </a:blip>
+          <a:stretch>
+            <a:fillRect/>
+          </a:stretch>
+        </p:blipFill>
+        <p:spPr>
+          <a:xfrm>
+            <a:off x="3111101" y="3724125"/>
+            <a:ext cx="2772112" cy="1980080"/>
+          </a:xfrm>
+          <a:prstGeom prst="rect">
+            <a:avLst/>
+          </a:prstGeom>
+        </p:spPr>
+      </p:pic>
     </p:spTree>
     <p:extLst>
       <p:ext uri="{BB962C8B-B14F-4D97-AF65-F5344CB8AC3E}">
-        <p14:creationId xmlns:p14="http://schemas.microsoft.com/office/powerpoint/2010/main" val="225003077"/>
+        <p14:creationId xmlns:p14="http://schemas.microsoft.com/office/powerpoint/2010/main" val="2624183201"/>
       </p:ext>
     </p:extLst>
   </p:cSld>
@@ -12657,8 +13391,28 @@
                 <a:latin typeface="Georgia" panose="02040502050405020303" pitchFamily="18" charset="0"/>
                 <a:cs typeface="Arial" panose="020B0604020202020204" pitchFamily="34" charset="0"/>
               </a:rPr>
-              <a:t>Model Generation</a:t>
-            </a:r>
+              <a:t>Model </a:t>
+            </a:r>
+            <a:r>
+              <a:rPr lang="en-US" dirty="0" smtClean="0">
+                <a:latin typeface="Georgia" panose="02040502050405020303" pitchFamily="18" charset="0"/>
+                <a:cs typeface="Arial" panose="020B0604020202020204" pitchFamily="34" charset="0"/>
+              </a:rPr>
+              <a:t>Generation</a:t>
+            </a:r>
+          </a:p>
+          <a:p>
+            <a:r>
+              <a:rPr lang="en-US" dirty="0" smtClean="0">
+                <a:latin typeface="Georgia" panose="02040502050405020303" pitchFamily="18" charset="0"/>
+                <a:cs typeface="Arial" panose="020B0604020202020204" pitchFamily="34" charset="0"/>
+              </a:rPr>
+              <a:t>Results</a:t>
+            </a:r>
+            <a:endParaRPr lang="en-US" dirty="0" smtClean="0">
+              <a:latin typeface="Georgia" panose="02040502050405020303" pitchFamily="18" charset="0"/>
+              <a:cs typeface="Arial" panose="020B0604020202020204" pitchFamily="34" charset="0"/>
+            </a:endParaRPr>
           </a:p>
           <a:p>
             <a:r>
@@ -12681,6 +13435,1709 @@
     <p:extLst>
       <p:ext uri="{BB962C8B-B14F-4D97-AF65-F5344CB8AC3E}">
         <p14:creationId xmlns:p14="http://schemas.microsoft.com/office/powerpoint/2010/main" val="3338530277"/>
+      </p:ext>
+    </p:extLst>
+  </p:cSld>
+  <p:clrMapOvr>
+    <a:masterClrMapping/>
+  </p:clrMapOvr>
+  <p:timing>
+    <p:tnLst>
+      <p:par>
+        <p:cTn id="1" dur="indefinite" restart="never" nodeType="tmRoot"/>
+      </p:par>
+    </p:tnLst>
+  </p:timing>
+</p:sld>
+</file>
+
+<file path=ppt/slides/slide20.xml><?xml version="1.0" encoding="utf-8"?>
+<p:sld xmlns:a="http://schemas.openxmlformats.org/drawingml/2006/main" xmlns:r="http://schemas.openxmlformats.org/officeDocument/2006/relationships" xmlns:p="http://schemas.openxmlformats.org/presentationml/2006/main" showMasterSp="0">
+  <p:cSld>
+    <p:spTree>
+      <p:nvGrpSpPr>
+        <p:cNvPr id="1" name=""/>
+        <p:cNvGrpSpPr/>
+        <p:nvPr/>
+      </p:nvGrpSpPr>
+      <p:grpSpPr>
+        <a:xfrm>
+          <a:off x="0" y="0"/>
+          <a:ext cx="0" cy="0"/>
+          <a:chOff x="0" y="0"/>
+          <a:chExt cx="0" cy="0"/>
+        </a:xfrm>
+      </p:grpSpPr>
+      <p:sp>
+        <p:nvSpPr>
+          <p:cNvPr id="2" name="Title 1"/>
+          <p:cNvSpPr>
+            <a:spLocks noGrp="1"/>
+          </p:cNvSpPr>
+          <p:nvPr>
+            <p:ph type="title"/>
+          </p:nvPr>
+        </p:nvSpPr>
+        <p:spPr/>
+        <p:txBody>
+          <a:bodyPr anchor="ctr"/>
+          <a:lstStyle/>
+          <a:p>
+            <a:r>
+              <a:rPr lang="en-US" dirty="0" smtClean="0"/>
+              <a:t>Results</a:t>
+            </a:r>
+            <a:endParaRPr lang="en-US" dirty="0">
+              <a:latin typeface="Georgia" panose="02040502050405020303" pitchFamily="18" charset="0"/>
+            </a:endParaRPr>
+          </a:p>
+        </p:txBody>
+      </p:sp>
+      <p:sp>
+        <p:nvSpPr>
+          <p:cNvPr id="6" name="TextBox 5"/>
+          <p:cNvSpPr txBox="1"/>
+          <p:nvPr/>
+        </p:nvSpPr>
+        <p:spPr>
+          <a:xfrm>
+            <a:off x="5867400" y="1954410"/>
+            <a:ext cx="3048000" cy="3046988"/>
+          </a:xfrm>
+          <a:prstGeom prst="rect">
+            <a:avLst/>
+          </a:prstGeom>
+          <a:noFill/>
+        </p:spPr>
+        <p:txBody>
+          <a:bodyPr wrap="square" rtlCol="0">
+            <a:spAutoFit/>
+          </a:bodyPr>
+          <a:lstStyle/>
+          <a:p>
+            <a:pPr marL="285750" indent="-285750">
+              <a:buFont typeface="Arial" panose="020B0604020202020204" pitchFamily="34" charset="0"/>
+              <a:buChar char="•"/>
+            </a:pPr>
+            <a:r>
+              <a:rPr lang="en-US" sz="1600" dirty="0" smtClean="0">
+                <a:latin typeface="Georgia" panose="02040502050405020303" pitchFamily="18" charset="0"/>
+              </a:rPr>
+              <a:t>Slight negative trend</a:t>
+            </a:r>
+          </a:p>
+          <a:p>
+            <a:endParaRPr lang="en-US" sz="1600" dirty="0">
+              <a:latin typeface="Georgia" panose="02040502050405020303" pitchFamily="18" charset="0"/>
+            </a:endParaRPr>
+          </a:p>
+          <a:p>
+            <a:pPr marL="285750" indent="-285750">
+              <a:buFont typeface="Arial" panose="020B0604020202020204" pitchFamily="34" charset="0"/>
+              <a:buChar char="•"/>
+            </a:pPr>
+            <a:r>
+              <a:rPr lang="en-US" sz="1600" dirty="0" smtClean="0">
+                <a:latin typeface="Georgia" panose="02040502050405020303" pitchFamily="18" charset="0"/>
+              </a:rPr>
+              <a:t>Increasing income can decrease crime rate</a:t>
+            </a:r>
+          </a:p>
+          <a:p>
+            <a:pPr marL="285750" indent="-285750">
+              <a:buFont typeface="Arial" panose="020B0604020202020204" pitchFamily="34" charset="0"/>
+              <a:buChar char="•"/>
+            </a:pPr>
+            <a:endParaRPr lang="en-US" sz="1600" dirty="0">
+              <a:latin typeface="Georgia" panose="02040502050405020303" pitchFamily="18" charset="0"/>
+            </a:endParaRPr>
+          </a:p>
+          <a:p>
+            <a:pPr marL="285750" indent="-285750">
+              <a:buFont typeface="Arial" panose="020B0604020202020204" pitchFamily="34" charset="0"/>
+              <a:buChar char="•"/>
+            </a:pPr>
+            <a:r>
+              <a:rPr lang="en-US" sz="1600" dirty="0">
+                <a:latin typeface="Georgia" panose="02040502050405020303" pitchFamily="18" charset="0"/>
+              </a:rPr>
+              <a:t>Example: </a:t>
+            </a:r>
+            <a:r>
+              <a:rPr lang="en-US" sz="1600" dirty="0" smtClean="0">
+                <a:latin typeface="Georgia" panose="02040502050405020303" pitchFamily="18" charset="0"/>
+              </a:rPr>
+              <a:t>Raising income by </a:t>
+            </a:r>
+            <a:r>
+              <a:rPr lang="en-US" sz="1600" dirty="0">
+                <a:latin typeface="Georgia" panose="02040502050405020303" pitchFamily="18" charset="0"/>
+              </a:rPr>
+              <a:t>50% decreases crime rate from </a:t>
+            </a:r>
+            <a:r>
+              <a:rPr lang="en-US" sz="1600" dirty="0" smtClean="0">
+                <a:latin typeface="Georgia" panose="02040502050405020303" pitchFamily="18" charset="0"/>
+              </a:rPr>
+              <a:t>0.24% </a:t>
+            </a:r>
+            <a:r>
+              <a:rPr lang="en-US" sz="1600" dirty="0">
+                <a:latin typeface="Georgia" panose="02040502050405020303" pitchFamily="18" charset="0"/>
+              </a:rPr>
+              <a:t>to </a:t>
+            </a:r>
+            <a:r>
+              <a:rPr lang="en-US" sz="1600" dirty="0" smtClean="0">
+                <a:latin typeface="Georgia" panose="02040502050405020303" pitchFamily="18" charset="0"/>
+              </a:rPr>
+              <a:t>0.22%.</a:t>
+            </a:r>
+            <a:endParaRPr lang="en-US" sz="1600" dirty="0">
+              <a:latin typeface="Georgia" panose="02040502050405020303" pitchFamily="18" charset="0"/>
+            </a:endParaRPr>
+          </a:p>
+          <a:p>
+            <a:pPr marL="285750" indent="-285750">
+              <a:buFont typeface="Arial" panose="020B0604020202020204" pitchFamily="34" charset="0"/>
+              <a:buChar char="•"/>
+            </a:pPr>
+            <a:endParaRPr lang="en-US" sz="1600" dirty="0" smtClean="0">
+              <a:latin typeface="Georgia" panose="02040502050405020303" pitchFamily="18" charset="0"/>
+            </a:endParaRPr>
+          </a:p>
+          <a:p>
+            <a:pPr marL="285750" indent="-285750">
+              <a:buFont typeface="Arial" panose="020B0604020202020204" pitchFamily="34" charset="0"/>
+              <a:buChar char="•"/>
+            </a:pPr>
+            <a:endParaRPr lang="en-US" sz="1600" dirty="0">
+              <a:latin typeface="Georgia" panose="02040502050405020303" pitchFamily="18" charset="0"/>
+            </a:endParaRPr>
+          </a:p>
+          <a:p>
+            <a:pPr marL="285750" indent="-285750">
+              <a:buFont typeface="Arial" panose="020B0604020202020204" pitchFamily="34" charset="0"/>
+              <a:buChar char="•"/>
+            </a:pPr>
+            <a:endParaRPr lang="en-US" sz="1600" dirty="0">
+              <a:latin typeface="Georgia" panose="02040502050405020303" pitchFamily="18" charset="0"/>
+            </a:endParaRPr>
+          </a:p>
+          <a:p>
+            <a:pPr marL="285750" indent="-285750">
+              <a:buFont typeface="Arial" panose="020B0604020202020204" pitchFamily="34" charset="0"/>
+              <a:buChar char="•"/>
+            </a:pPr>
+            <a:endParaRPr lang="en-US" sz="1600" dirty="0" smtClean="0">
+              <a:latin typeface="Georgia" panose="02040502050405020303" pitchFamily="18" charset="0"/>
+            </a:endParaRPr>
+          </a:p>
+        </p:txBody>
+      </p:sp>
+      <p:sp>
+        <p:nvSpPr>
+          <p:cNvPr id="3" name="AutoShape 2"/>
+          <p:cNvSpPr>
+            <a:spLocks noChangeAspect="1" noChangeArrowheads="1"/>
+          </p:cNvSpPr>
+          <p:nvPr/>
+        </p:nvSpPr>
+        <p:spPr bwMode="auto">
+          <a:xfrm>
+            <a:off x="63500" y="-136525"/>
+            <a:ext cx="304800" cy="304800"/>
+          </a:xfrm>
+          <a:prstGeom prst="rect">
+            <a:avLst/>
+          </a:prstGeom>
+          <a:noFill/>
+          <a:extLst>
+            <a:ext uri="{909E8E84-426E-40DD-AFC4-6F175D3DCCD1}">
+              <a14:hiddenFill xmlns:a14="http://schemas.microsoft.com/office/drawing/2010/main">
+                <a:solidFill>
+                  <a:srgbClr val="FFFFFF"/>
+                </a:solidFill>
+              </a14:hiddenFill>
+            </a:ext>
+          </a:extLst>
+        </p:spPr>
+        <p:txBody>
+          <a:bodyPr vert="horz" wrap="square" lIns="91440" tIns="45720" rIns="91440" bIns="45720" numCol="1" anchor="t" anchorCtr="0" compatLnSpc="1">
+            <a:prstTxWarp prst="textNoShape">
+              <a:avLst/>
+            </a:prstTxWarp>
+          </a:bodyPr>
+          <a:lstStyle/>
+          <a:p>
+            <a:endParaRPr lang="en-US"/>
+          </a:p>
+        </p:txBody>
+      </p:sp>
+      <p:pic>
+        <p:nvPicPr>
+          <p:cNvPr id="9" name="Content Placeholder 8"/>
+          <p:cNvPicPr>
+            <a:picLocks noGrp="1" noChangeAspect="1"/>
+          </p:cNvPicPr>
+          <p:nvPr>
+            <p:ph idx="1"/>
+          </p:nvPr>
+        </p:nvPicPr>
+        <p:blipFill>
+          <a:blip r:embed="rId2">
+            <a:extLst>
+              <a:ext uri="{28A0092B-C50C-407E-A947-70E740481C1C}">
+                <a14:useLocalDpi xmlns:a14="http://schemas.microsoft.com/office/drawing/2010/main" val="0"/>
+              </a:ext>
+            </a:extLst>
+          </a:blip>
+          <a:stretch>
+            <a:fillRect/>
+          </a:stretch>
+        </p:blipFill>
+        <p:spPr>
+          <a:xfrm>
+            <a:off x="215898" y="1523999"/>
+            <a:ext cx="5575301" cy="3982357"/>
+          </a:xfrm>
+        </p:spPr>
+      </p:pic>
+      <p:pic>
+        <p:nvPicPr>
+          <p:cNvPr id="7" name="Picture 6"/>
+          <p:cNvPicPr>
+            <a:picLocks noChangeAspect="1"/>
+          </p:cNvPicPr>
+          <p:nvPr/>
+        </p:nvPicPr>
+        <p:blipFill>
+          <a:blip r:embed="rId3">
+            <a:extLst>
+              <a:ext uri="{28A0092B-C50C-407E-A947-70E740481C1C}">
+                <a14:useLocalDpi xmlns:a14="http://schemas.microsoft.com/office/drawing/2010/main" val="0"/>
+              </a:ext>
+            </a:extLst>
+          </a:blip>
+          <a:stretch>
+            <a:fillRect/>
+          </a:stretch>
+        </p:blipFill>
+        <p:spPr>
+          <a:xfrm>
+            <a:off x="237466" y="1524000"/>
+            <a:ext cx="5557776" cy="3969839"/>
+          </a:xfrm>
+          <a:prstGeom prst="rect">
+            <a:avLst/>
+          </a:prstGeom>
+        </p:spPr>
+      </p:pic>
+    </p:spTree>
+    <p:extLst>
+      <p:ext uri="{BB962C8B-B14F-4D97-AF65-F5344CB8AC3E}">
+        <p14:creationId xmlns:p14="http://schemas.microsoft.com/office/powerpoint/2010/main" val="1177589788"/>
+      </p:ext>
+    </p:extLst>
+  </p:cSld>
+  <p:clrMapOvr>
+    <a:masterClrMapping/>
+  </p:clrMapOvr>
+  <p:timing>
+    <p:tnLst>
+      <p:par>
+        <p:cTn id="1" dur="indefinite" restart="never" nodeType="tmRoot"/>
+      </p:par>
+    </p:tnLst>
+  </p:timing>
+</p:sld>
+</file>
+
+<file path=ppt/slides/slide21.xml><?xml version="1.0" encoding="utf-8"?>
+<p:sld xmlns:a="http://schemas.openxmlformats.org/drawingml/2006/main" xmlns:r="http://schemas.openxmlformats.org/officeDocument/2006/relationships" xmlns:p="http://schemas.openxmlformats.org/presentationml/2006/main" showMasterSp="0">
+  <p:cSld>
+    <p:spTree>
+      <p:nvGrpSpPr>
+        <p:cNvPr id="1" name=""/>
+        <p:cNvGrpSpPr/>
+        <p:nvPr/>
+      </p:nvGrpSpPr>
+      <p:grpSpPr>
+        <a:xfrm>
+          <a:off x="0" y="0"/>
+          <a:ext cx="0" cy="0"/>
+          <a:chOff x="0" y="0"/>
+          <a:chExt cx="0" cy="0"/>
+        </a:xfrm>
+      </p:grpSpPr>
+      <p:sp>
+        <p:nvSpPr>
+          <p:cNvPr id="2" name="Title 1"/>
+          <p:cNvSpPr>
+            <a:spLocks noGrp="1"/>
+          </p:cNvSpPr>
+          <p:nvPr>
+            <p:ph type="title"/>
+          </p:nvPr>
+        </p:nvSpPr>
+        <p:spPr/>
+        <p:txBody>
+          <a:bodyPr anchor="ctr"/>
+          <a:lstStyle/>
+          <a:p>
+            <a:r>
+              <a:rPr lang="en-US" dirty="0" smtClean="0"/>
+              <a:t>Results</a:t>
+            </a:r>
+            <a:endParaRPr lang="en-US" dirty="0">
+              <a:latin typeface="Georgia" panose="02040502050405020303" pitchFamily="18" charset="0"/>
+            </a:endParaRPr>
+          </a:p>
+        </p:txBody>
+      </p:sp>
+      <p:sp>
+        <p:nvSpPr>
+          <p:cNvPr id="6" name="TextBox 5"/>
+          <p:cNvSpPr txBox="1"/>
+          <p:nvPr/>
+        </p:nvSpPr>
+        <p:spPr>
+          <a:xfrm>
+            <a:off x="5867400" y="1954410"/>
+            <a:ext cx="3048000" cy="4524315"/>
+          </a:xfrm>
+          <a:prstGeom prst="rect">
+            <a:avLst/>
+          </a:prstGeom>
+          <a:noFill/>
+        </p:spPr>
+        <p:txBody>
+          <a:bodyPr wrap="square" rtlCol="0">
+            <a:spAutoFit/>
+          </a:bodyPr>
+          <a:lstStyle/>
+          <a:p>
+            <a:pPr marL="285750" indent="-285750">
+              <a:buFont typeface="Arial" panose="020B0604020202020204" pitchFamily="34" charset="0"/>
+              <a:buChar char="•"/>
+            </a:pPr>
+            <a:r>
+              <a:rPr lang="en-US" sz="1600" dirty="0" smtClean="0">
+                <a:latin typeface="Georgia" panose="02040502050405020303" pitchFamily="18" charset="0"/>
+              </a:rPr>
+              <a:t>Slight negative trend</a:t>
+            </a:r>
+          </a:p>
+          <a:p>
+            <a:endParaRPr lang="en-US" sz="1600" dirty="0">
+              <a:latin typeface="Georgia" panose="02040502050405020303" pitchFamily="18" charset="0"/>
+            </a:endParaRPr>
+          </a:p>
+          <a:p>
+            <a:pPr marL="285750" indent="-285750">
+              <a:buFont typeface="Arial" panose="020B0604020202020204" pitchFamily="34" charset="0"/>
+              <a:buChar char="•"/>
+            </a:pPr>
+            <a:r>
+              <a:rPr lang="en-US" sz="1600" dirty="0" smtClean="0">
+                <a:latin typeface="Georgia" panose="02040502050405020303" pitchFamily="18" charset="0"/>
+              </a:rPr>
+              <a:t>Decreasing debt can </a:t>
+            </a:r>
+            <a:r>
+              <a:rPr lang="en-US" sz="1600" b="1" dirty="0" smtClean="0">
+                <a:latin typeface="Georgia" panose="02040502050405020303" pitchFamily="18" charset="0"/>
+              </a:rPr>
+              <a:t>increase</a:t>
+            </a:r>
+            <a:r>
+              <a:rPr lang="en-US" sz="1600" dirty="0" smtClean="0">
+                <a:latin typeface="Georgia" panose="02040502050405020303" pitchFamily="18" charset="0"/>
+              </a:rPr>
+              <a:t> crime rate</a:t>
+            </a:r>
+          </a:p>
+          <a:p>
+            <a:pPr marL="285750" indent="-285750">
+              <a:buFont typeface="Arial" panose="020B0604020202020204" pitchFamily="34" charset="0"/>
+              <a:buChar char="•"/>
+            </a:pPr>
+            <a:endParaRPr lang="en-US" sz="1600" dirty="0" smtClean="0">
+              <a:latin typeface="Georgia" panose="02040502050405020303" pitchFamily="18" charset="0"/>
+            </a:endParaRPr>
+          </a:p>
+          <a:p>
+            <a:pPr marL="285750" indent="-285750">
+              <a:buFont typeface="Arial" panose="020B0604020202020204" pitchFamily="34" charset="0"/>
+              <a:buChar char="•"/>
+            </a:pPr>
+            <a:r>
+              <a:rPr lang="en-US" sz="1600" dirty="0">
+                <a:latin typeface="Georgia" panose="02040502050405020303" pitchFamily="18" charset="0"/>
+              </a:rPr>
+              <a:t>Example: </a:t>
+            </a:r>
+            <a:r>
+              <a:rPr lang="en-US" sz="1600" dirty="0" smtClean="0">
+                <a:latin typeface="Georgia" panose="02040502050405020303" pitchFamily="18" charset="0"/>
+              </a:rPr>
+              <a:t>Lowering debt </a:t>
+            </a:r>
+            <a:r>
+              <a:rPr lang="en-US" sz="1600" dirty="0">
+                <a:latin typeface="Georgia" panose="02040502050405020303" pitchFamily="18" charset="0"/>
+              </a:rPr>
+              <a:t>by 50% </a:t>
+            </a:r>
+            <a:r>
+              <a:rPr lang="en-US" sz="1600" b="1" dirty="0">
+                <a:latin typeface="Georgia" panose="02040502050405020303" pitchFamily="18" charset="0"/>
+              </a:rPr>
+              <a:t>increases</a:t>
+            </a:r>
+            <a:r>
+              <a:rPr lang="en-US" sz="1600" dirty="0">
+                <a:latin typeface="Georgia" panose="02040502050405020303" pitchFamily="18" charset="0"/>
+              </a:rPr>
+              <a:t> crime rate from 0.24% to 0.28%.</a:t>
+            </a:r>
+          </a:p>
+          <a:p>
+            <a:pPr marL="285750" indent="-285750">
+              <a:buFont typeface="Arial" panose="020B0604020202020204" pitchFamily="34" charset="0"/>
+              <a:buChar char="•"/>
+            </a:pPr>
+            <a:endParaRPr lang="en-US" sz="1600" dirty="0">
+              <a:latin typeface="Georgia" panose="02040502050405020303" pitchFamily="18" charset="0"/>
+            </a:endParaRPr>
+          </a:p>
+          <a:p>
+            <a:pPr marL="285750" indent="-285750">
+              <a:buFont typeface="Arial" panose="020B0604020202020204" pitchFamily="34" charset="0"/>
+              <a:buChar char="•"/>
+            </a:pPr>
+            <a:r>
+              <a:rPr lang="en-US" sz="1600" dirty="0" smtClean="0">
+                <a:latin typeface="Georgia" panose="02040502050405020303" pitchFamily="18" charset="0"/>
+              </a:rPr>
+              <a:t>Seems counter intuitive</a:t>
+            </a:r>
+          </a:p>
+          <a:p>
+            <a:pPr marL="285750" indent="-285750">
+              <a:buFont typeface="Arial" panose="020B0604020202020204" pitchFamily="34" charset="0"/>
+              <a:buChar char="•"/>
+            </a:pPr>
+            <a:endParaRPr lang="en-US" sz="1600" dirty="0">
+              <a:latin typeface="Georgia" panose="02040502050405020303" pitchFamily="18" charset="0"/>
+            </a:endParaRPr>
+          </a:p>
+          <a:p>
+            <a:pPr marL="285750" indent="-285750">
+              <a:buFont typeface="Arial" panose="020B0604020202020204" pitchFamily="34" charset="0"/>
+              <a:buChar char="•"/>
+            </a:pPr>
+            <a:r>
+              <a:rPr lang="en-US" sz="1600" dirty="0" smtClean="0">
+                <a:latin typeface="Georgia" panose="02040502050405020303" pitchFamily="18" charset="0"/>
+              </a:rPr>
+              <a:t>Outside factors </a:t>
+            </a:r>
+          </a:p>
+          <a:p>
+            <a:pPr marL="285750" indent="-285750">
+              <a:buFont typeface="Arial" panose="020B0604020202020204" pitchFamily="34" charset="0"/>
+              <a:buChar char="•"/>
+            </a:pPr>
+            <a:endParaRPr lang="en-US" sz="1600" dirty="0">
+              <a:latin typeface="Georgia" panose="02040502050405020303" pitchFamily="18" charset="0"/>
+            </a:endParaRPr>
+          </a:p>
+          <a:p>
+            <a:pPr marL="285750" indent="-285750">
+              <a:buFont typeface="Arial" panose="020B0604020202020204" pitchFamily="34" charset="0"/>
+              <a:buChar char="•"/>
+            </a:pPr>
+            <a:r>
+              <a:rPr lang="en-US" sz="1600" dirty="0" smtClean="0">
+                <a:latin typeface="Georgia" panose="02040502050405020303" pitchFamily="18" charset="0"/>
+              </a:rPr>
+              <a:t>“</a:t>
+            </a:r>
+            <a:r>
+              <a:rPr lang="en-US" sz="1600" dirty="0">
+                <a:latin typeface="Georgia" panose="02040502050405020303" pitchFamily="18" charset="0"/>
+              </a:rPr>
+              <a:t>G</a:t>
+            </a:r>
+            <a:r>
+              <a:rPr lang="en-US" sz="1600" dirty="0" smtClean="0">
+                <a:latin typeface="Georgia" panose="02040502050405020303" pitchFamily="18" charset="0"/>
+              </a:rPr>
+              <a:t>ood debt”</a:t>
+            </a:r>
+            <a:endParaRPr lang="en-US" sz="1600" dirty="0" smtClean="0">
+              <a:latin typeface="Georgia" panose="02040502050405020303" pitchFamily="18" charset="0"/>
+            </a:endParaRPr>
+          </a:p>
+          <a:p>
+            <a:pPr marL="285750" indent="-285750">
+              <a:buFont typeface="Arial" panose="020B0604020202020204" pitchFamily="34" charset="0"/>
+              <a:buChar char="•"/>
+            </a:pPr>
+            <a:endParaRPr lang="en-US" sz="1600" dirty="0" smtClean="0">
+              <a:latin typeface="Georgia" panose="02040502050405020303" pitchFamily="18" charset="0"/>
+            </a:endParaRPr>
+          </a:p>
+          <a:p>
+            <a:pPr marL="285750" indent="-285750">
+              <a:buFont typeface="Arial" panose="020B0604020202020204" pitchFamily="34" charset="0"/>
+              <a:buChar char="•"/>
+            </a:pPr>
+            <a:endParaRPr lang="en-US" sz="1600" dirty="0">
+              <a:latin typeface="Georgia" panose="02040502050405020303" pitchFamily="18" charset="0"/>
+            </a:endParaRPr>
+          </a:p>
+          <a:p>
+            <a:pPr marL="285750" indent="-285750">
+              <a:buFont typeface="Arial" panose="020B0604020202020204" pitchFamily="34" charset="0"/>
+              <a:buChar char="•"/>
+            </a:pPr>
+            <a:endParaRPr lang="en-US" sz="1600" dirty="0">
+              <a:latin typeface="Georgia" panose="02040502050405020303" pitchFamily="18" charset="0"/>
+            </a:endParaRPr>
+          </a:p>
+          <a:p>
+            <a:pPr marL="285750" indent="-285750">
+              <a:buFont typeface="Arial" panose="020B0604020202020204" pitchFamily="34" charset="0"/>
+              <a:buChar char="•"/>
+            </a:pPr>
+            <a:endParaRPr lang="en-US" sz="1600" dirty="0" smtClean="0">
+              <a:latin typeface="Georgia" panose="02040502050405020303" pitchFamily="18" charset="0"/>
+            </a:endParaRPr>
+          </a:p>
+        </p:txBody>
+      </p:sp>
+      <p:sp>
+        <p:nvSpPr>
+          <p:cNvPr id="3" name="AutoShape 2"/>
+          <p:cNvSpPr>
+            <a:spLocks noChangeAspect="1" noChangeArrowheads="1"/>
+          </p:cNvSpPr>
+          <p:nvPr/>
+        </p:nvSpPr>
+        <p:spPr bwMode="auto">
+          <a:xfrm>
+            <a:off x="63500" y="-136525"/>
+            <a:ext cx="304800" cy="304800"/>
+          </a:xfrm>
+          <a:prstGeom prst="rect">
+            <a:avLst/>
+          </a:prstGeom>
+          <a:noFill/>
+          <a:extLst>
+            <a:ext uri="{909E8E84-426E-40DD-AFC4-6F175D3DCCD1}">
+              <a14:hiddenFill xmlns:a14="http://schemas.microsoft.com/office/drawing/2010/main">
+                <a:solidFill>
+                  <a:srgbClr val="FFFFFF"/>
+                </a:solidFill>
+              </a14:hiddenFill>
+            </a:ext>
+          </a:extLst>
+        </p:spPr>
+        <p:txBody>
+          <a:bodyPr vert="horz" wrap="square" lIns="91440" tIns="45720" rIns="91440" bIns="45720" numCol="1" anchor="t" anchorCtr="0" compatLnSpc="1">
+            <a:prstTxWarp prst="textNoShape">
+              <a:avLst/>
+            </a:prstTxWarp>
+          </a:bodyPr>
+          <a:lstStyle/>
+          <a:p>
+            <a:endParaRPr lang="en-US"/>
+          </a:p>
+        </p:txBody>
+      </p:sp>
+      <p:pic>
+        <p:nvPicPr>
+          <p:cNvPr id="9" name="Content Placeholder 8"/>
+          <p:cNvPicPr>
+            <a:picLocks noGrp="1" noChangeAspect="1"/>
+          </p:cNvPicPr>
+          <p:nvPr>
+            <p:ph idx="1"/>
+          </p:nvPr>
+        </p:nvPicPr>
+        <p:blipFill>
+          <a:blip r:embed="rId2">
+            <a:extLst>
+              <a:ext uri="{28A0092B-C50C-407E-A947-70E740481C1C}">
+                <a14:useLocalDpi xmlns:a14="http://schemas.microsoft.com/office/drawing/2010/main" val="0"/>
+              </a:ext>
+            </a:extLst>
+          </a:blip>
+          <a:stretch>
+            <a:fillRect/>
+          </a:stretch>
+        </p:blipFill>
+        <p:spPr>
+          <a:xfrm>
+            <a:off x="215898" y="1523999"/>
+            <a:ext cx="5575301" cy="3982357"/>
+          </a:xfrm>
+        </p:spPr>
+      </p:pic>
+      <p:pic>
+        <p:nvPicPr>
+          <p:cNvPr id="7" name="Picture 6"/>
+          <p:cNvPicPr>
+            <a:picLocks noChangeAspect="1"/>
+          </p:cNvPicPr>
+          <p:nvPr/>
+        </p:nvPicPr>
+        <p:blipFill>
+          <a:blip r:embed="rId3">
+            <a:extLst>
+              <a:ext uri="{28A0092B-C50C-407E-A947-70E740481C1C}">
+                <a14:useLocalDpi xmlns:a14="http://schemas.microsoft.com/office/drawing/2010/main" val="0"/>
+              </a:ext>
+            </a:extLst>
+          </a:blip>
+          <a:stretch>
+            <a:fillRect/>
+          </a:stretch>
+        </p:blipFill>
+        <p:spPr>
+          <a:xfrm>
+            <a:off x="237466" y="1524000"/>
+            <a:ext cx="5557775" cy="3969839"/>
+          </a:xfrm>
+          <a:prstGeom prst="rect">
+            <a:avLst/>
+          </a:prstGeom>
+        </p:spPr>
+      </p:pic>
+    </p:spTree>
+    <p:extLst>
+      <p:ext uri="{BB962C8B-B14F-4D97-AF65-F5344CB8AC3E}">
+        <p14:creationId xmlns:p14="http://schemas.microsoft.com/office/powerpoint/2010/main" val="5313808"/>
+      </p:ext>
+    </p:extLst>
+  </p:cSld>
+  <p:clrMapOvr>
+    <a:masterClrMapping/>
+  </p:clrMapOvr>
+  <p:timing>
+    <p:tnLst>
+      <p:par>
+        <p:cTn id="1" dur="indefinite" restart="never" nodeType="tmRoot"/>
+      </p:par>
+    </p:tnLst>
+  </p:timing>
+</p:sld>
+</file>
+
+<file path=ppt/slides/slide22.xml><?xml version="1.0" encoding="utf-8"?>
+<p:sld xmlns:a="http://schemas.openxmlformats.org/drawingml/2006/main" xmlns:r="http://schemas.openxmlformats.org/officeDocument/2006/relationships" xmlns:p="http://schemas.openxmlformats.org/presentationml/2006/main" showMasterSp="0">
+  <p:cSld>
+    <p:spTree>
+      <p:nvGrpSpPr>
+        <p:cNvPr id="1" name=""/>
+        <p:cNvGrpSpPr/>
+        <p:nvPr/>
+      </p:nvGrpSpPr>
+      <p:grpSpPr>
+        <a:xfrm>
+          <a:off x="0" y="0"/>
+          <a:ext cx="0" cy="0"/>
+          <a:chOff x="0" y="0"/>
+          <a:chExt cx="0" cy="0"/>
+        </a:xfrm>
+      </p:grpSpPr>
+      <p:sp>
+        <p:nvSpPr>
+          <p:cNvPr id="2" name="Title 1"/>
+          <p:cNvSpPr>
+            <a:spLocks noGrp="1"/>
+          </p:cNvSpPr>
+          <p:nvPr>
+            <p:ph type="title"/>
+          </p:nvPr>
+        </p:nvSpPr>
+        <p:spPr/>
+        <p:txBody>
+          <a:bodyPr anchor="ctr"/>
+          <a:lstStyle/>
+          <a:p>
+            <a:r>
+              <a:rPr lang="en-US" dirty="0" smtClean="0"/>
+              <a:t>Results</a:t>
+            </a:r>
+            <a:endParaRPr lang="en-US" dirty="0">
+              <a:latin typeface="Georgia" panose="02040502050405020303" pitchFamily="18" charset="0"/>
+            </a:endParaRPr>
+          </a:p>
+        </p:txBody>
+      </p:sp>
+      <p:sp>
+        <p:nvSpPr>
+          <p:cNvPr id="6" name="TextBox 5"/>
+          <p:cNvSpPr txBox="1"/>
+          <p:nvPr/>
+        </p:nvSpPr>
+        <p:spPr>
+          <a:xfrm>
+            <a:off x="5867400" y="1954410"/>
+            <a:ext cx="3048000" cy="3046988"/>
+          </a:xfrm>
+          <a:prstGeom prst="rect">
+            <a:avLst/>
+          </a:prstGeom>
+          <a:noFill/>
+        </p:spPr>
+        <p:txBody>
+          <a:bodyPr wrap="square" rtlCol="0">
+            <a:spAutoFit/>
+          </a:bodyPr>
+          <a:lstStyle/>
+          <a:p>
+            <a:pPr marL="285750" indent="-285750">
+              <a:buFont typeface="Arial" panose="020B0604020202020204" pitchFamily="34" charset="0"/>
+              <a:buChar char="•"/>
+            </a:pPr>
+            <a:r>
+              <a:rPr lang="en-US" sz="1600" dirty="0" smtClean="0">
+                <a:latin typeface="Georgia" panose="02040502050405020303" pitchFamily="18" charset="0"/>
+              </a:rPr>
+              <a:t>Slight negative trend</a:t>
+            </a:r>
+          </a:p>
+          <a:p>
+            <a:endParaRPr lang="en-US" sz="1600" dirty="0">
+              <a:latin typeface="Georgia" panose="02040502050405020303" pitchFamily="18" charset="0"/>
+            </a:endParaRPr>
+          </a:p>
+          <a:p>
+            <a:pPr marL="285750" indent="-285750">
+              <a:buFont typeface="Arial" panose="020B0604020202020204" pitchFamily="34" charset="0"/>
+              <a:buChar char="•"/>
+            </a:pPr>
+            <a:r>
+              <a:rPr lang="en-US" sz="1600" dirty="0" smtClean="0">
+                <a:latin typeface="Georgia" panose="02040502050405020303" pitchFamily="18" charset="0"/>
+              </a:rPr>
+              <a:t>Increasing retention can decrease crime rate</a:t>
+            </a:r>
+          </a:p>
+          <a:p>
+            <a:pPr marL="285750" indent="-285750">
+              <a:buFont typeface="Arial" panose="020B0604020202020204" pitchFamily="34" charset="0"/>
+              <a:buChar char="•"/>
+            </a:pPr>
+            <a:endParaRPr lang="en-US" sz="1600" dirty="0">
+              <a:latin typeface="Georgia" panose="02040502050405020303" pitchFamily="18" charset="0"/>
+            </a:endParaRPr>
+          </a:p>
+          <a:p>
+            <a:pPr marL="285750" indent="-285750">
+              <a:buFont typeface="Arial" panose="020B0604020202020204" pitchFamily="34" charset="0"/>
+              <a:buChar char="•"/>
+            </a:pPr>
+            <a:r>
+              <a:rPr lang="en-US" sz="1600" dirty="0">
+                <a:latin typeface="Georgia" panose="02040502050405020303" pitchFamily="18" charset="0"/>
+              </a:rPr>
+              <a:t>Example: </a:t>
+            </a:r>
+            <a:r>
+              <a:rPr lang="en-US" sz="1600" dirty="0" smtClean="0">
+                <a:latin typeface="Georgia" panose="02040502050405020303" pitchFamily="18" charset="0"/>
+              </a:rPr>
+              <a:t>Raising retention by </a:t>
+            </a:r>
+            <a:r>
+              <a:rPr lang="en-US" sz="1600" dirty="0">
+                <a:latin typeface="Georgia" panose="02040502050405020303" pitchFamily="18" charset="0"/>
+              </a:rPr>
+              <a:t>50% decreases crime rate from </a:t>
+            </a:r>
+            <a:r>
+              <a:rPr lang="en-US" sz="1600" dirty="0" smtClean="0">
+                <a:latin typeface="Georgia" panose="02040502050405020303" pitchFamily="18" charset="0"/>
+              </a:rPr>
+              <a:t>0.24% </a:t>
+            </a:r>
+            <a:r>
+              <a:rPr lang="en-US" sz="1600" dirty="0">
+                <a:latin typeface="Georgia" panose="02040502050405020303" pitchFamily="18" charset="0"/>
+              </a:rPr>
+              <a:t>to </a:t>
+            </a:r>
+            <a:r>
+              <a:rPr lang="en-US" sz="1600" dirty="0" smtClean="0">
+                <a:latin typeface="Georgia" panose="02040502050405020303" pitchFamily="18" charset="0"/>
+              </a:rPr>
+              <a:t>0.23%.</a:t>
+            </a:r>
+            <a:endParaRPr lang="en-US" sz="1600" dirty="0">
+              <a:latin typeface="Georgia" panose="02040502050405020303" pitchFamily="18" charset="0"/>
+            </a:endParaRPr>
+          </a:p>
+          <a:p>
+            <a:pPr marL="285750" indent="-285750">
+              <a:buFont typeface="Arial" panose="020B0604020202020204" pitchFamily="34" charset="0"/>
+              <a:buChar char="•"/>
+            </a:pPr>
+            <a:endParaRPr lang="en-US" sz="1600" dirty="0" smtClean="0">
+              <a:latin typeface="Georgia" panose="02040502050405020303" pitchFamily="18" charset="0"/>
+            </a:endParaRPr>
+          </a:p>
+          <a:p>
+            <a:pPr marL="285750" indent="-285750">
+              <a:buFont typeface="Arial" panose="020B0604020202020204" pitchFamily="34" charset="0"/>
+              <a:buChar char="•"/>
+            </a:pPr>
+            <a:endParaRPr lang="en-US" sz="1600" dirty="0">
+              <a:latin typeface="Georgia" panose="02040502050405020303" pitchFamily="18" charset="0"/>
+            </a:endParaRPr>
+          </a:p>
+          <a:p>
+            <a:pPr marL="285750" indent="-285750">
+              <a:buFont typeface="Arial" panose="020B0604020202020204" pitchFamily="34" charset="0"/>
+              <a:buChar char="•"/>
+            </a:pPr>
+            <a:endParaRPr lang="en-US" sz="1600" dirty="0">
+              <a:latin typeface="Georgia" panose="02040502050405020303" pitchFamily="18" charset="0"/>
+            </a:endParaRPr>
+          </a:p>
+          <a:p>
+            <a:pPr marL="285750" indent="-285750">
+              <a:buFont typeface="Arial" panose="020B0604020202020204" pitchFamily="34" charset="0"/>
+              <a:buChar char="•"/>
+            </a:pPr>
+            <a:endParaRPr lang="en-US" sz="1600" dirty="0" smtClean="0">
+              <a:latin typeface="Georgia" panose="02040502050405020303" pitchFamily="18" charset="0"/>
+            </a:endParaRPr>
+          </a:p>
+        </p:txBody>
+      </p:sp>
+      <p:sp>
+        <p:nvSpPr>
+          <p:cNvPr id="3" name="AutoShape 2"/>
+          <p:cNvSpPr>
+            <a:spLocks noChangeAspect="1" noChangeArrowheads="1"/>
+          </p:cNvSpPr>
+          <p:nvPr/>
+        </p:nvSpPr>
+        <p:spPr bwMode="auto">
+          <a:xfrm>
+            <a:off x="63500" y="-136525"/>
+            <a:ext cx="304800" cy="304800"/>
+          </a:xfrm>
+          <a:prstGeom prst="rect">
+            <a:avLst/>
+          </a:prstGeom>
+          <a:noFill/>
+          <a:extLst>
+            <a:ext uri="{909E8E84-426E-40DD-AFC4-6F175D3DCCD1}">
+              <a14:hiddenFill xmlns:a14="http://schemas.microsoft.com/office/drawing/2010/main">
+                <a:solidFill>
+                  <a:srgbClr val="FFFFFF"/>
+                </a:solidFill>
+              </a14:hiddenFill>
+            </a:ext>
+          </a:extLst>
+        </p:spPr>
+        <p:txBody>
+          <a:bodyPr vert="horz" wrap="square" lIns="91440" tIns="45720" rIns="91440" bIns="45720" numCol="1" anchor="t" anchorCtr="0" compatLnSpc="1">
+            <a:prstTxWarp prst="textNoShape">
+              <a:avLst/>
+            </a:prstTxWarp>
+          </a:bodyPr>
+          <a:lstStyle/>
+          <a:p>
+            <a:endParaRPr lang="en-US"/>
+          </a:p>
+        </p:txBody>
+      </p:sp>
+      <p:pic>
+        <p:nvPicPr>
+          <p:cNvPr id="9" name="Content Placeholder 8"/>
+          <p:cNvPicPr>
+            <a:picLocks noGrp="1" noChangeAspect="1"/>
+          </p:cNvPicPr>
+          <p:nvPr>
+            <p:ph idx="1"/>
+          </p:nvPr>
+        </p:nvPicPr>
+        <p:blipFill>
+          <a:blip r:embed="rId2">
+            <a:extLst>
+              <a:ext uri="{28A0092B-C50C-407E-A947-70E740481C1C}">
+                <a14:useLocalDpi xmlns:a14="http://schemas.microsoft.com/office/drawing/2010/main" val="0"/>
+              </a:ext>
+            </a:extLst>
+          </a:blip>
+          <a:stretch>
+            <a:fillRect/>
+          </a:stretch>
+        </p:blipFill>
+        <p:spPr>
+          <a:xfrm>
+            <a:off x="215898" y="1523999"/>
+            <a:ext cx="5575301" cy="3982357"/>
+          </a:xfrm>
+        </p:spPr>
+      </p:pic>
+      <p:pic>
+        <p:nvPicPr>
+          <p:cNvPr id="7" name="Picture 6"/>
+          <p:cNvPicPr>
+            <a:picLocks noChangeAspect="1"/>
+          </p:cNvPicPr>
+          <p:nvPr/>
+        </p:nvPicPr>
+        <p:blipFill>
+          <a:blip r:embed="rId3">
+            <a:extLst>
+              <a:ext uri="{28A0092B-C50C-407E-A947-70E740481C1C}">
+                <a14:useLocalDpi xmlns:a14="http://schemas.microsoft.com/office/drawing/2010/main" val="0"/>
+              </a:ext>
+            </a:extLst>
+          </a:blip>
+          <a:stretch>
+            <a:fillRect/>
+          </a:stretch>
+        </p:blipFill>
+        <p:spPr>
+          <a:xfrm>
+            <a:off x="237466" y="1524000"/>
+            <a:ext cx="5557775" cy="3969839"/>
+          </a:xfrm>
+          <a:prstGeom prst="rect">
+            <a:avLst/>
+          </a:prstGeom>
+        </p:spPr>
+      </p:pic>
+    </p:spTree>
+    <p:extLst>
+      <p:ext uri="{BB962C8B-B14F-4D97-AF65-F5344CB8AC3E}">
+        <p14:creationId xmlns:p14="http://schemas.microsoft.com/office/powerpoint/2010/main" val="3306032058"/>
+      </p:ext>
+    </p:extLst>
+  </p:cSld>
+  <p:clrMapOvr>
+    <a:masterClrMapping/>
+  </p:clrMapOvr>
+  <p:timing>
+    <p:tnLst>
+      <p:par>
+        <p:cTn id="1" dur="indefinite" restart="never" nodeType="tmRoot"/>
+      </p:par>
+    </p:tnLst>
+  </p:timing>
+</p:sld>
+</file>
+
+<file path=ppt/slides/slide23.xml><?xml version="1.0" encoding="utf-8"?>
+<p:sld xmlns:a="http://schemas.openxmlformats.org/drawingml/2006/main" xmlns:r="http://schemas.openxmlformats.org/officeDocument/2006/relationships" xmlns:p="http://schemas.openxmlformats.org/presentationml/2006/main" showMasterSp="0">
+  <p:cSld>
+    <p:spTree>
+      <p:nvGrpSpPr>
+        <p:cNvPr id="1" name=""/>
+        <p:cNvGrpSpPr/>
+        <p:nvPr/>
+      </p:nvGrpSpPr>
+      <p:grpSpPr>
+        <a:xfrm>
+          <a:off x="0" y="0"/>
+          <a:ext cx="0" cy="0"/>
+          <a:chOff x="0" y="0"/>
+          <a:chExt cx="0" cy="0"/>
+        </a:xfrm>
+      </p:grpSpPr>
+      <p:sp>
+        <p:nvSpPr>
+          <p:cNvPr id="2" name="Title 1"/>
+          <p:cNvSpPr>
+            <a:spLocks noGrp="1"/>
+          </p:cNvSpPr>
+          <p:nvPr>
+            <p:ph type="title"/>
+          </p:nvPr>
+        </p:nvSpPr>
+        <p:spPr/>
+        <p:txBody>
+          <a:bodyPr anchor="ctr"/>
+          <a:lstStyle/>
+          <a:p>
+            <a:r>
+              <a:rPr lang="en-US" dirty="0" smtClean="0"/>
+              <a:t>Results</a:t>
+            </a:r>
+            <a:endParaRPr lang="en-US" dirty="0">
+              <a:latin typeface="Georgia" panose="02040502050405020303" pitchFamily="18" charset="0"/>
+            </a:endParaRPr>
+          </a:p>
+        </p:txBody>
+      </p:sp>
+      <p:sp>
+        <p:nvSpPr>
+          <p:cNvPr id="6" name="TextBox 5"/>
+          <p:cNvSpPr txBox="1"/>
+          <p:nvPr/>
+        </p:nvSpPr>
+        <p:spPr>
+          <a:xfrm>
+            <a:off x="5867400" y="1954410"/>
+            <a:ext cx="3048000" cy="4770537"/>
+          </a:xfrm>
+          <a:prstGeom prst="rect">
+            <a:avLst/>
+          </a:prstGeom>
+          <a:noFill/>
+        </p:spPr>
+        <p:txBody>
+          <a:bodyPr wrap="square" rtlCol="0">
+            <a:spAutoFit/>
+          </a:bodyPr>
+          <a:lstStyle/>
+          <a:p>
+            <a:pPr marL="285750" indent="-285750">
+              <a:buFont typeface="Arial" panose="020B0604020202020204" pitchFamily="34" charset="0"/>
+              <a:buChar char="•"/>
+            </a:pPr>
+            <a:r>
+              <a:rPr lang="en-US" sz="1600" dirty="0" smtClean="0">
+                <a:latin typeface="Georgia" panose="02040502050405020303" pitchFamily="18" charset="0"/>
+              </a:rPr>
+              <a:t>Slight negative trend</a:t>
+            </a:r>
+          </a:p>
+          <a:p>
+            <a:endParaRPr lang="en-US" sz="1600" dirty="0">
+              <a:latin typeface="Georgia" panose="02040502050405020303" pitchFamily="18" charset="0"/>
+            </a:endParaRPr>
+          </a:p>
+          <a:p>
+            <a:pPr marL="285750" indent="-285750">
+              <a:buFont typeface="Arial" panose="020B0604020202020204" pitchFamily="34" charset="0"/>
+              <a:buChar char="•"/>
+            </a:pPr>
+            <a:r>
+              <a:rPr lang="en-US" sz="1600" dirty="0" smtClean="0">
+                <a:latin typeface="Georgia" panose="02040502050405020303" pitchFamily="18" charset="0"/>
+              </a:rPr>
+              <a:t>Decreasing cost of college can </a:t>
+            </a:r>
+            <a:r>
+              <a:rPr lang="en-US" sz="1600" b="1" dirty="0" smtClean="0">
+                <a:latin typeface="Georgia" panose="02040502050405020303" pitchFamily="18" charset="0"/>
+              </a:rPr>
+              <a:t>increase</a:t>
+            </a:r>
+            <a:r>
+              <a:rPr lang="en-US" sz="1600" dirty="0" smtClean="0">
+                <a:latin typeface="Georgia" panose="02040502050405020303" pitchFamily="18" charset="0"/>
+              </a:rPr>
+              <a:t> crime rate</a:t>
+            </a:r>
+          </a:p>
+          <a:p>
+            <a:pPr marL="285750" indent="-285750">
+              <a:buFont typeface="Arial" panose="020B0604020202020204" pitchFamily="34" charset="0"/>
+              <a:buChar char="•"/>
+            </a:pPr>
+            <a:endParaRPr lang="en-US" sz="1600" dirty="0">
+              <a:latin typeface="Georgia" panose="02040502050405020303" pitchFamily="18" charset="0"/>
+            </a:endParaRPr>
+          </a:p>
+          <a:p>
+            <a:pPr marL="285750" indent="-285750">
+              <a:buFont typeface="Arial" panose="020B0604020202020204" pitchFamily="34" charset="0"/>
+              <a:buChar char="•"/>
+            </a:pPr>
+            <a:r>
+              <a:rPr lang="en-US" sz="1600" dirty="0">
+                <a:latin typeface="Georgia" panose="02040502050405020303" pitchFamily="18" charset="0"/>
+              </a:rPr>
+              <a:t>Example: </a:t>
+            </a:r>
+            <a:r>
+              <a:rPr lang="en-US" sz="1600" dirty="0" smtClean="0">
+                <a:latin typeface="Georgia" panose="02040502050405020303" pitchFamily="18" charset="0"/>
+              </a:rPr>
+              <a:t>Lowering cost by </a:t>
+            </a:r>
+            <a:r>
+              <a:rPr lang="en-US" sz="1600" dirty="0">
+                <a:latin typeface="Georgia" panose="02040502050405020303" pitchFamily="18" charset="0"/>
+              </a:rPr>
+              <a:t>50% </a:t>
+            </a:r>
+            <a:r>
+              <a:rPr lang="en-US" sz="1600" b="1" dirty="0" smtClean="0">
+                <a:latin typeface="Georgia" panose="02040502050405020303" pitchFamily="18" charset="0"/>
+              </a:rPr>
+              <a:t>increases </a:t>
+            </a:r>
+            <a:r>
+              <a:rPr lang="en-US" sz="1600" dirty="0" smtClean="0">
+                <a:latin typeface="Georgia" panose="02040502050405020303" pitchFamily="18" charset="0"/>
+              </a:rPr>
+              <a:t>crime </a:t>
+            </a:r>
+            <a:r>
+              <a:rPr lang="en-US" sz="1600" dirty="0">
+                <a:latin typeface="Georgia" panose="02040502050405020303" pitchFamily="18" charset="0"/>
+              </a:rPr>
+              <a:t>rate from </a:t>
+            </a:r>
+            <a:r>
+              <a:rPr lang="en-US" sz="1600" dirty="0" smtClean="0">
+                <a:latin typeface="Georgia" panose="02040502050405020303" pitchFamily="18" charset="0"/>
+              </a:rPr>
+              <a:t>0.24% </a:t>
+            </a:r>
+            <a:r>
+              <a:rPr lang="en-US" sz="1600" dirty="0">
+                <a:latin typeface="Georgia" panose="02040502050405020303" pitchFamily="18" charset="0"/>
+              </a:rPr>
+              <a:t>to </a:t>
+            </a:r>
+            <a:r>
+              <a:rPr lang="en-US" sz="1600" dirty="0" smtClean="0">
+                <a:latin typeface="Georgia" panose="02040502050405020303" pitchFamily="18" charset="0"/>
+              </a:rPr>
+              <a:t>0.31%.</a:t>
+            </a:r>
+          </a:p>
+          <a:p>
+            <a:pPr marL="285750" indent="-285750">
+              <a:buFont typeface="Arial" panose="020B0604020202020204" pitchFamily="34" charset="0"/>
+              <a:buChar char="•"/>
+            </a:pPr>
+            <a:endParaRPr lang="en-US" sz="1600" dirty="0">
+              <a:latin typeface="Georgia" panose="02040502050405020303" pitchFamily="18" charset="0"/>
+            </a:endParaRPr>
+          </a:p>
+          <a:p>
+            <a:pPr marL="285750" indent="-285750">
+              <a:buFont typeface="Arial" panose="020B0604020202020204" pitchFamily="34" charset="0"/>
+              <a:buChar char="•"/>
+            </a:pPr>
+            <a:r>
+              <a:rPr lang="en-US" sz="1600" dirty="0" smtClean="0">
+                <a:latin typeface="Georgia" panose="02040502050405020303" pitchFamily="18" charset="0"/>
+              </a:rPr>
+              <a:t>Also seems counter intuitive</a:t>
+            </a:r>
+          </a:p>
+          <a:p>
+            <a:pPr marL="285750" indent="-285750">
+              <a:buFont typeface="Arial" panose="020B0604020202020204" pitchFamily="34" charset="0"/>
+              <a:buChar char="•"/>
+            </a:pPr>
+            <a:endParaRPr lang="en-US" sz="1600" dirty="0">
+              <a:latin typeface="Georgia" panose="02040502050405020303" pitchFamily="18" charset="0"/>
+            </a:endParaRPr>
+          </a:p>
+          <a:p>
+            <a:pPr marL="285750" indent="-285750">
+              <a:buFont typeface="Arial" panose="020B0604020202020204" pitchFamily="34" charset="0"/>
+              <a:buChar char="•"/>
+            </a:pPr>
+            <a:r>
+              <a:rPr lang="en-US" sz="1600" dirty="0" smtClean="0">
+                <a:latin typeface="Georgia" panose="02040502050405020303" pitchFamily="18" charset="0"/>
+              </a:rPr>
+              <a:t>Outside factors </a:t>
+            </a:r>
+          </a:p>
+          <a:p>
+            <a:pPr marL="285750" indent="-285750">
+              <a:buFont typeface="Arial" panose="020B0604020202020204" pitchFamily="34" charset="0"/>
+              <a:buChar char="•"/>
+            </a:pPr>
+            <a:endParaRPr lang="en-US" sz="1600" dirty="0">
+              <a:latin typeface="Georgia" panose="02040502050405020303" pitchFamily="18" charset="0"/>
+            </a:endParaRPr>
+          </a:p>
+          <a:p>
+            <a:pPr marL="285750" indent="-285750">
+              <a:buFont typeface="Arial" panose="020B0604020202020204" pitchFamily="34" charset="0"/>
+              <a:buChar char="•"/>
+            </a:pPr>
+            <a:r>
+              <a:rPr lang="en-US" sz="1600" dirty="0" smtClean="0">
+                <a:latin typeface="Georgia" panose="02040502050405020303" pitchFamily="18" charset="0"/>
+              </a:rPr>
+              <a:t>Higher cost may correlate to higher quality of institutions</a:t>
+            </a:r>
+            <a:endParaRPr lang="en-US" sz="1600" dirty="0">
+              <a:latin typeface="Georgia" panose="02040502050405020303" pitchFamily="18" charset="0"/>
+            </a:endParaRPr>
+          </a:p>
+          <a:p>
+            <a:pPr marL="285750" indent="-285750">
+              <a:buFont typeface="Arial" panose="020B0604020202020204" pitchFamily="34" charset="0"/>
+              <a:buChar char="•"/>
+            </a:pPr>
+            <a:endParaRPr lang="en-US" sz="1600" dirty="0" smtClean="0">
+              <a:latin typeface="Georgia" panose="02040502050405020303" pitchFamily="18" charset="0"/>
+            </a:endParaRPr>
+          </a:p>
+          <a:p>
+            <a:pPr marL="285750" indent="-285750">
+              <a:buFont typeface="Arial" panose="020B0604020202020204" pitchFamily="34" charset="0"/>
+              <a:buChar char="•"/>
+            </a:pPr>
+            <a:endParaRPr lang="en-US" sz="1600" dirty="0">
+              <a:latin typeface="Georgia" panose="02040502050405020303" pitchFamily="18" charset="0"/>
+            </a:endParaRPr>
+          </a:p>
+          <a:p>
+            <a:pPr marL="285750" indent="-285750">
+              <a:buFont typeface="Arial" panose="020B0604020202020204" pitchFamily="34" charset="0"/>
+              <a:buChar char="•"/>
+            </a:pPr>
+            <a:endParaRPr lang="en-US" sz="1600" dirty="0">
+              <a:latin typeface="Georgia" panose="02040502050405020303" pitchFamily="18" charset="0"/>
+            </a:endParaRPr>
+          </a:p>
+          <a:p>
+            <a:pPr marL="285750" indent="-285750">
+              <a:buFont typeface="Arial" panose="020B0604020202020204" pitchFamily="34" charset="0"/>
+              <a:buChar char="•"/>
+            </a:pPr>
+            <a:endParaRPr lang="en-US" sz="1600" dirty="0" smtClean="0">
+              <a:latin typeface="Georgia" panose="02040502050405020303" pitchFamily="18" charset="0"/>
+            </a:endParaRPr>
+          </a:p>
+        </p:txBody>
+      </p:sp>
+      <p:sp>
+        <p:nvSpPr>
+          <p:cNvPr id="3" name="AutoShape 2"/>
+          <p:cNvSpPr>
+            <a:spLocks noChangeAspect="1" noChangeArrowheads="1"/>
+          </p:cNvSpPr>
+          <p:nvPr/>
+        </p:nvSpPr>
+        <p:spPr bwMode="auto">
+          <a:xfrm>
+            <a:off x="63500" y="-136525"/>
+            <a:ext cx="304800" cy="304800"/>
+          </a:xfrm>
+          <a:prstGeom prst="rect">
+            <a:avLst/>
+          </a:prstGeom>
+          <a:noFill/>
+          <a:extLst>
+            <a:ext uri="{909E8E84-426E-40DD-AFC4-6F175D3DCCD1}">
+              <a14:hiddenFill xmlns:a14="http://schemas.microsoft.com/office/drawing/2010/main">
+                <a:solidFill>
+                  <a:srgbClr val="FFFFFF"/>
+                </a:solidFill>
+              </a14:hiddenFill>
+            </a:ext>
+          </a:extLst>
+        </p:spPr>
+        <p:txBody>
+          <a:bodyPr vert="horz" wrap="square" lIns="91440" tIns="45720" rIns="91440" bIns="45720" numCol="1" anchor="t" anchorCtr="0" compatLnSpc="1">
+            <a:prstTxWarp prst="textNoShape">
+              <a:avLst/>
+            </a:prstTxWarp>
+          </a:bodyPr>
+          <a:lstStyle/>
+          <a:p>
+            <a:endParaRPr lang="en-US"/>
+          </a:p>
+        </p:txBody>
+      </p:sp>
+      <p:pic>
+        <p:nvPicPr>
+          <p:cNvPr id="9" name="Content Placeholder 8"/>
+          <p:cNvPicPr>
+            <a:picLocks noGrp="1" noChangeAspect="1"/>
+          </p:cNvPicPr>
+          <p:nvPr>
+            <p:ph idx="1"/>
+          </p:nvPr>
+        </p:nvPicPr>
+        <p:blipFill>
+          <a:blip r:embed="rId2">
+            <a:extLst>
+              <a:ext uri="{28A0092B-C50C-407E-A947-70E740481C1C}">
+                <a14:useLocalDpi xmlns:a14="http://schemas.microsoft.com/office/drawing/2010/main" val="0"/>
+              </a:ext>
+            </a:extLst>
+          </a:blip>
+          <a:stretch>
+            <a:fillRect/>
+          </a:stretch>
+        </p:blipFill>
+        <p:spPr>
+          <a:xfrm>
+            <a:off x="215898" y="1523999"/>
+            <a:ext cx="5575301" cy="3982357"/>
+          </a:xfrm>
+        </p:spPr>
+      </p:pic>
+      <p:pic>
+        <p:nvPicPr>
+          <p:cNvPr id="7" name="Picture 6"/>
+          <p:cNvPicPr>
+            <a:picLocks noChangeAspect="1"/>
+          </p:cNvPicPr>
+          <p:nvPr/>
+        </p:nvPicPr>
+        <p:blipFill>
+          <a:blip r:embed="rId3">
+            <a:extLst>
+              <a:ext uri="{28A0092B-C50C-407E-A947-70E740481C1C}">
+                <a14:useLocalDpi xmlns:a14="http://schemas.microsoft.com/office/drawing/2010/main" val="0"/>
+              </a:ext>
+            </a:extLst>
+          </a:blip>
+          <a:stretch>
+            <a:fillRect/>
+          </a:stretch>
+        </p:blipFill>
+        <p:spPr>
+          <a:xfrm>
+            <a:off x="237466" y="1524000"/>
+            <a:ext cx="5557775" cy="3969839"/>
+          </a:xfrm>
+          <a:prstGeom prst="rect">
+            <a:avLst/>
+          </a:prstGeom>
+        </p:spPr>
+      </p:pic>
+    </p:spTree>
+    <p:extLst>
+      <p:ext uri="{BB962C8B-B14F-4D97-AF65-F5344CB8AC3E}">
+        <p14:creationId xmlns:p14="http://schemas.microsoft.com/office/powerpoint/2010/main" val="983160409"/>
+      </p:ext>
+    </p:extLst>
+  </p:cSld>
+  <p:clrMapOvr>
+    <a:masterClrMapping/>
+  </p:clrMapOvr>
+  <p:timing>
+    <p:tnLst>
+      <p:par>
+        <p:cTn id="1" dur="indefinite" restart="never" nodeType="tmRoot"/>
+      </p:par>
+    </p:tnLst>
+  </p:timing>
+</p:sld>
+</file>
+
+<file path=ppt/slides/slide24.xml><?xml version="1.0" encoding="utf-8"?>
+<p:sld xmlns:a="http://schemas.openxmlformats.org/drawingml/2006/main" xmlns:r="http://schemas.openxmlformats.org/officeDocument/2006/relationships" xmlns:p="http://schemas.openxmlformats.org/presentationml/2006/main" showMasterSp="0">
+  <p:cSld>
+    <p:spTree>
+      <p:nvGrpSpPr>
+        <p:cNvPr id="1" name=""/>
+        <p:cNvGrpSpPr/>
+        <p:nvPr/>
+      </p:nvGrpSpPr>
+      <p:grpSpPr>
+        <a:xfrm>
+          <a:off x="0" y="0"/>
+          <a:ext cx="0" cy="0"/>
+          <a:chOff x="0" y="0"/>
+          <a:chExt cx="0" cy="0"/>
+        </a:xfrm>
+      </p:grpSpPr>
+      <p:sp>
+        <p:nvSpPr>
+          <p:cNvPr id="2" name="Title 1"/>
+          <p:cNvSpPr>
+            <a:spLocks noGrp="1"/>
+          </p:cNvSpPr>
+          <p:nvPr>
+            <p:ph type="title"/>
+          </p:nvPr>
+        </p:nvSpPr>
+        <p:spPr/>
+        <p:txBody>
+          <a:bodyPr anchor="ctr"/>
+          <a:lstStyle/>
+          <a:p>
+            <a:r>
+              <a:rPr lang="en-US" dirty="0" smtClean="0"/>
+              <a:t>Conclusions</a:t>
+            </a:r>
+            <a:endParaRPr lang="en-US" dirty="0"/>
+          </a:p>
+        </p:txBody>
+      </p:sp>
+      <p:sp>
+        <p:nvSpPr>
+          <p:cNvPr id="3" name="Content Placeholder 2"/>
+          <p:cNvSpPr>
+            <a:spLocks noGrp="1"/>
+          </p:cNvSpPr>
+          <p:nvPr>
+            <p:ph idx="1"/>
+          </p:nvPr>
+        </p:nvSpPr>
+        <p:spPr/>
+        <p:txBody>
+          <a:bodyPr anchor="ctr">
+            <a:normAutofit/>
+          </a:bodyPr>
+          <a:lstStyle/>
+          <a:p>
+            <a:pPr marL="0" indent="0">
+              <a:buNone/>
+            </a:pPr>
+            <a:r>
+              <a:rPr lang="en-US" sz="2800" dirty="0" smtClean="0">
+                <a:latin typeface="Georgia" panose="02040502050405020303" pitchFamily="18" charset="0"/>
+                <a:cs typeface="Arial" panose="020B0604020202020204" pitchFamily="34" charset="0"/>
+              </a:rPr>
+              <a:t>Model Selection to Predict VCR</a:t>
+            </a:r>
+          </a:p>
+          <a:p>
+            <a:pPr lvl="1"/>
+            <a:r>
+              <a:rPr lang="en-US" dirty="0" smtClean="0">
+                <a:latin typeface="Georgia" panose="02040502050405020303" pitchFamily="18" charset="0"/>
+                <a:cs typeface="Arial" panose="020B0604020202020204" pitchFamily="34" charset="0"/>
+              </a:rPr>
+              <a:t>Underwent 4 different methods to validate strength of models</a:t>
+            </a:r>
+            <a:endParaRPr lang="en-US" dirty="0">
+              <a:latin typeface="Georgia" panose="02040502050405020303" pitchFamily="18" charset="0"/>
+              <a:cs typeface="Arial" panose="020B0604020202020204" pitchFamily="34" charset="0"/>
+            </a:endParaRPr>
+          </a:p>
+          <a:p>
+            <a:pPr lvl="1"/>
+            <a:r>
+              <a:rPr lang="en-US" dirty="0" smtClean="0">
+                <a:latin typeface="Georgia" panose="02040502050405020303" pitchFamily="18" charset="0"/>
+                <a:cs typeface="Arial" panose="020B0604020202020204" pitchFamily="34" charset="0"/>
+              </a:rPr>
+              <a:t>Model 5 for violent cities</a:t>
+            </a:r>
+          </a:p>
+          <a:p>
+            <a:pPr lvl="1"/>
+            <a:r>
+              <a:rPr lang="en-US" dirty="0" smtClean="0">
+                <a:latin typeface="Georgia" panose="02040502050405020303" pitchFamily="18" charset="0"/>
+                <a:cs typeface="Arial" panose="020B0604020202020204" pitchFamily="34" charset="0"/>
+              </a:rPr>
+              <a:t>Model 3 for safe cities</a:t>
+            </a:r>
+          </a:p>
+          <a:p>
+            <a:pPr lvl="1"/>
+            <a:endParaRPr lang="en-US" dirty="0">
+              <a:latin typeface="Georgia" panose="02040502050405020303" pitchFamily="18" charset="0"/>
+              <a:cs typeface="Arial" panose="020B0604020202020204" pitchFamily="34" charset="0"/>
+            </a:endParaRPr>
+          </a:p>
+          <a:p>
+            <a:pPr marL="0" indent="0">
+              <a:buNone/>
+            </a:pPr>
+            <a:r>
+              <a:rPr lang="en-US" sz="2800" dirty="0" smtClean="0">
+                <a:latin typeface="Georgia" panose="02040502050405020303" pitchFamily="18" charset="0"/>
+                <a:cs typeface="Arial" panose="020B0604020202020204" pitchFamily="34" charset="0"/>
+              </a:rPr>
+              <a:t>Hypothesis Check</a:t>
+            </a:r>
+          </a:p>
+          <a:p>
+            <a:pPr lvl="1"/>
+            <a:r>
+              <a:rPr lang="en-US" dirty="0" smtClean="0">
+                <a:latin typeface="Georgia" panose="02040502050405020303" pitchFamily="18" charset="0"/>
+                <a:cs typeface="Arial" panose="020B0604020202020204" pitchFamily="34" charset="0"/>
+              </a:rPr>
+              <a:t>Violent crime in violent cities is significantly impacted by unemployment rate, college graduation rate, and median debt of its population</a:t>
+            </a:r>
+          </a:p>
+          <a:p>
+            <a:pPr lvl="1"/>
+            <a:r>
+              <a:rPr lang="en-US" dirty="0" smtClean="0">
+                <a:latin typeface="Georgia" panose="02040502050405020303" pitchFamily="18" charset="0"/>
+                <a:cs typeface="Arial" panose="020B0604020202020204" pitchFamily="34" charset="0"/>
+              </a:rPr>
+              <a:t>Violent crime is safe cities is significantly impacted by median income, median debt, average cost of college, and retention rate of colleges</a:t>
+            </a:r>
+          </a:p>
+        </p:txBody>
+      </p:sp>
+    </p:spTree>
+    <p:extLst>
+      <p:ext uri="{BB962C8B-B14F-4D97-AF65-F5344CB8AC3E}">
+        <p14:creationId xmlns:p14="http://schemas.microsoft.com/office/powerpoint/2010/main" val="2239191880"/>
+      </p:ext>
+    </p:extLst>
+  </p:cSld>
+  <p:clrMapOvr>
+    <a:masterClrMapping/>
+  </p:clrMapOvr>
+  <p:timing>
+    <p:tnLst>
+      <p:par>
+        <p:cTn id="1" dur="indefinite" restart="never" nodeType="tmRoot"/>
+      </p:par>
+    </p:tnLst>
+  </p:timing>
+</p:sld>
+</file>
+
+<file path=ppt/slides/slide25.xml><?xml version="1.0" encoding="utf-8"?>
+<p:sld xmlns:a="http://schemas.openxmlformats.org/drawingml/2006/main" xmlns:r="http://schemas.openxmlformats.org/officeDocument/2006/relationships" xmlns:p="http://schemas.openxmlformats.org/presentationml/2006/main" showMasterSp="0">
+  <p:cSld>
+    <p:spTree>
+      <p:nvGrpSpPr>
+        <p:cNvPr id="1" name=""/>
+        <p:cNvGrpSpPr/>
+        <p:nvPr/>
+      </p:nvGrpSpPr>
+      <p:grpSpPr>
+        <a:xfrm>
+          <a:off x="0" y="0"/>
+          <a:ext cx="0" cy="0"/>
+          <a:chOff x="0" y="0"/>
+          <a:chExt cx="0" cy="0"/>
+        </a:xfrm>
+      </p:grpSpPr>
+      <p:sp>
+        <p:nvSpPr>
+          <p:cNvPr id="2" name="Title 1"/>
+          <p:cNvSpPr>
+            <a:spLocks noGrp="1"/>
+          </p:cNvSpPr>
+          <p:nvPr>
+            <p:ph type="title"/>
+          </p:nvPr>
+        </p:nvSpPr>
+        <p:spPr/>
+        <p:txBody>
+          <a:bodyPr anchor="ctr"/>
+          <a:lstStyle/>
+          <a:p>
+            <a:r>
+              <a:rPr lang="en-US" dirty="0" smtClean="0"/>
+              <a:t>Recommendations</a:t>
+            </a:r>
+            <a:endParaRPr lang="en-US" dirty="0"/>
+          </a:p>
+        </p:txBody>
+      </p:sp>
+      <p:sp>
+        <p:nvSpPr>
+          <p:cNvPr id="3" name="Content Placeholder 2"/>
+          <p:cNvSpPr>
+            <a:spLocks noGrp="1"/>
+          </p:cNvSpPr>
+          <p:nvPr>
+            <p:ph idx="1"/>
+          </p:nvPr>
+        </p:nvSpPr>
+        <p:spPr/>
+        <p:txBody>
+          <a:bodyPr anchor="ctr">
+            <a:normAutofit/>
+          </a:bodyPr>
+          <a:lstStyle/>
+          <a:p>
+            <a:pPr marL="0" indent="0">
+              <a:buNone/>
+            </a:pPr>
+            <a:r>
+              <a:rPr lang="en-US" sz="2800" dirty="0" smtClean="0">
+                <a:latin typeface="Georgia" panose="02040502050405020303" pitchFamily="18" charset="0"/>
+                <a:cs typeface="Arial" panose="020B0604020202020204" pitchFamily="34" charset="0"/>
+              </a:rPr>
+              <a:t>Policy</a:t>
+            </a:r>
+            <a:endParaRPr lang="en-US" dirty="0" smtClean="0">
+              <a:latin typeface="Georgia" panose="02040502050405020303" pitchFamily="18" charset="0"/>
+              <a:cs typeface="Arial" panose="020B0604020202020204" pitchFamily="34" charset="0"/>
+            </a:endParaRPr>
+          </a:p>
+          <a:p>
+            <a:pPr lvl="1"/>
+            <a:r>
+              <a:rPr lang="en-US" dirty="0" smtClean="0">
+                <a:latin typeface="Georgia" panose="02040502050405020303" pitchFamily="18" charset="0"/>
+                <a:cs typeface="Arial" panose="020B0604020202020204" pitchFamily="34" charset="0"/>
+              </a:rPr>
+              <a:t>Collect more data on job and educational opportunities to create a more robust model</a:t>
+            </a:r>
+          </a:p>
+          <a:p>
+            <a:pPr lvl="1"/>
+            <a:r>
+              <a:rPr lang="en-US" dirty="0">
+                <a:latin typeface="Georgia" panose="02040502050405020303" pitchFamily="18" charset="0"/>
+                <a:cs typeface="Arial" panose="020B0604020202020204" pitchFamily="34" charset="0"/>
+              </a:rPr>
+              <a:t>Determine where your cities lies based on its violent crime rate</a:t>
+            </a:r>
+          </a:p>
+          <a:p>
+            <a:pPr lvl="1"/>
+            <a:r>
+              <a:rPr lang="en-US" dirty="0" smtClean="0">
+                <a:latin typeface="Georgia" panose="02040502050405020303" pitchFamily="18" charset="0"/>
+                <a:cs typeface="Arial" panose="020B0604020202020204" pitchFamily="34" charset="0"/>
+              </a:rPr>
+              <a:t>Budget for more preventative measures in addition to law enforcement</a:t>
+            </a:r>
+          </a:p>
+          <a:p>
+            <a:pPr lvl="1"/>
+            <a:r>
+              <a:rPr lang="en-US" dirty="0" smtClean="0">
+                <a:latin typeface="Georgia" panose="02040502050405020303" pitchFamily="18" charset="0"/>
+                <a:cs typeface="Arial" panose="020B0604020202020204" pitchFamily="34" charset="0"/>
+              </a:rPr>
+              <a:t>Improve the job market, reduce the cost of education, reduce the incentive to be in debt, </a:t>
+            </a:r>
+          </a:p>
+          <a:p>
+            <a:pPr lvl="1"/>
+            <a:r>
+              <a:rPr lang="en-US" dirty="0" smtClean="0">
+                <a:latin typeface="Georgia" panose="02040502050405020303" pitchFamily="18" charset="0"/>
+                <a:cs typeface="Arial" panose="020B0604020202020204" pitchFamily="34" charset="0"/>
+              </a:rPr>
+              <a:t>Look to answer different questions with different machine learning models</a:t>
+            </a:r>
+          </a:p>
+          <a:p>
+            <a:pPr lvl="1"/>
+            <a:r>
+              <a:rPr lang="en-US" dirty="0" smtClean="0">
+                <a:latin typeface="Georgia" panose="02040502050405020303" pitchFamily="18" charset="0"/>
+                <a:cs typeface="Arial" panose="020B0604020202020204" pitchFamily="34" charset="0"/>
+              </a:rPr>
+              <a:t>Base policy on data-driven analysis over ideological dogma</a:t>
+            </a:r>
+            <a:endParaRPr lang="en-US" dirty="0">
+              <a:latin typeface="Georgia" panose="02040502050405020303" pitchFamily="18" charset="0"/>
+              <a:cs typeface="Arial" panose="020B0604020202020204" pitchFamily="34" charset="0"/>
+            </a:endParaRPr>
+          </a:p>
+        </p:txBody>
+      </p:sp>
+    </p:spTree>
+    <p:extLst>
+      <p:ext uri="{BB962C8B-B14F-4D97-AF65-F5344CB8AC3E}">
+        <p14:creationId xmlns:p14="http://schemas.microsoft.com/office/powerpoint/2010/main" val="225003077"/>
       </p:ext>
     </p:extLst>
   </p:cSld>

</xml_diff>